<commit_message>
experiments with other images
</commit_message>
<xml_diff>
--- a/docs/proj2_report.pptx
+++ b/docs/proj2_report.pptx
@@ -18582,16 +18582,42 @@
               </a:tabLst>
             </a:pPr>
             <a:r>
-              <a:rPr lang="en-US" sz="2800" b="0" strike="noStrike" spc="-1">
+              <a:rPr lang="en-US" sz="2800" b="0" strike="noStrike" spc="-1" dirty="0">
                 <a:solidFill>
                   <a:srgbClr val="585858"/>
                 </a:solidFill>
                 <a:latin typeface="Arial"/>
-                <a:ea typeface="Arial"/>
-              </a:rPr>
-              <a:t>[name]</a:t>
-            </a:r>
-            <a:endParaRPr lang="en-US" sz="2800" b="0" strike="noStrike" spc="-1">
+              </a:rPr>
+              <a:t>Venkata </a:t>
+            </a:r>
+            <a:r>
+              <a:rPr lang="en-US" sz="2800" b="0" strike="noStrike" spc="-1" dirty="0" err="1">
+                <a:solidFill>
+                  <a:srgbClr val="585858"/>
+                </a:solidFill>
+                <a:latin typeface="Arial"/>
+              </a:rPr>
+              <a:t>Aashutosh</a:t>
+            </a:r>
+            <a:r>
+              <a:rPr lang="en-US" sz="2800" b="0" strike="noStrike" spc="-1" dirty="0">
+                <a:solidFill>
+                  <a:srgbClr val="585858"/>
+                </a:solidFill>
+                <a:latin typeface="Arial"/>
+              </a:rPr>
+              <a:t> </a:t>
+            </a:r>
+            <a:r>
+              <a:rPr lang="en-US" sz="2800" b="0" strike="noStrike" spc="-1" dirty="0" err="1">
+                <a:solidFill>
+                  <a:srgbClr val="585858"/>
+                </a:solidFill>
+                <a:latin typeface="Arial"/>
+              </a:rPr>
+              <a:t>Aripirala</a:t>
+            </a:r>
+            <a:endParaRPr lang="en-US" sz="2800" b="0" strike="noStrike" spc="-1" dirty="0">
               <a:solidFill>
                 <a:srgbClr val="585858"/>
               </a:solidFill>
@@ -18609,16 +18635,16 @@
               </a:tabLst>
             </a:pPr>
             <a:r>
-              <a:rPr lang="en-US" sz="2800" b="0" strike="noStrike" spc="-1">
+              <a:rPr lang="en-US" sz="2800" b="0" strike="noStrike" spc="-1" dirty="0">
                 <a:solidFill>
                   <a:srgbClr val="585858"/>
                 </a:solidFill>
                 <a:latin typeface="Arial"/>
                 <a:ea typeface="Arial"/>
               </a:rPr>
-              <a:t>[GT email]</a:t>
-            </a:r>
-            <a:endParaRPr lang="en-US" sz="2800" b="0" strike="noStrike" spc="-1">
+              <a:t>av84@gatech.edu</a:t>
+            </a:r>
+            <a:endParaRPr lang="en-US" sz="2800" b="0" strike="noStrike" spc="-1" dirty="0">
               <a:solidFill>
                 <a:srgbClr val="585858"/>
               </a:solidFill>
@@ -18636,16 +18662,16 @@
               </a:tabLst>
             </a:pPr>
             <a:r>
-              <a:rPr lang="en-US" sz="2800" b="0" strike="noStrike" spc="-1">
+              <a:rPr lang="en-US" sz="2800" b="0" strike="noStrike" spc="-1" dirty="0">
                 <a:solidFill>
                   <a:srgbClr val="585858"/>
                 </a:solidFill>
                 <a:latin typeface="Arial"/>
                 <a:ea typeface="Arial"/>
               </a:rPr>
-              <a:t>[GT username]</a:t>
-            </a:r>
-            <a:endParaRPr lang="en-US" sz="2800" b="0" strike="noStrike" spc="-1">
+              <a:t>av84</a:t>
+            </a:r>
+            <a:endParaRPr lang="en-US" sz="2800" b="0" strike="noStrike" spc="-1" dirty="0">
               <a:solidFill>
                 <a:srgbClr val="585858"/>
               </a:solidFill>
@@ -18663,16 +18689,16 @@
               </a:tabLst>
             </a:pPr>
             <a:r>
-              <a:rPr lang="en-US" sz="2800" b="0" strike="noStrike" spc="-1">
+              <a:rPr lang="en-US" sz="2800" b="0" strike="noStrike" spc="-1" dirty="0">
                 <a:solidFill>
                   <a:srgbClr val="585858"/>
                 </a:solidFill>
                 <a:latin typeface="Arial"/>
                 <a:ea typeface="Arial"/>
               </a:rPr>
-              <a:t>[GTID]</a:t>
-            </a:r>
-            <a:endParaRPr lang="en-US" sz="2800" b="0" strike="noStrike" spc="-1">
+              <a:t>904173725</a:t>
+            </a:r>
+            <a:endParaRPr lang="en-US" sz="2800" b="0" strike="noStrike" spc="-1" dirty="0">
               <a:solidFill>
                 <a:srgbClr val="585858"/>
               </a:solidFill>
@@ -18930,7 +18956,7 @@
         </p:nvSpPr>
         <p:spPr>
           <a:xfrm>
-            <a:off x="311760" y="444960"/>
+            <a:off x="311759" y="291330"/>
             <a:ext cx="8520120" cy="572400"/>
           </a:xfrm>
           <a:prstGeom prst="rect">
@@ -18957,7 +18983,7 @@
               </a:tabLst>
             </a:pPr>
             <a:r>
-              <a:rPr lang="en-US" sz="2300" b="0" strike="noStrike" spc="-1">
+              <a:rPr lang="en-US" sz="2300" b="0" strike="noStrike" spc="-1" dirty="0">
                 <a:solidFill>
                   <a:srgbClr val="000000"/>
                 </a:solidFill>
@@ -18966,7 +18992,7 @@
               </a:rPr>
               <a:t>Part 2: Feature matching</a:t>
             </a:r>
-            <a:endParaRPr lang="en-US" sz="2300" b="0" strike="noStrike" spc="-1">
+            <a:endParaRPr lang="en-US" sz="2300" b="0" strike="noStrike" spc="-1" dirty="0">
               <a:solidFill>
                 <a:srgbClr val="000000"/>
               </a:solidFill>
@@ -18987,7 +19013,7 @@
         </p:nvSpPr>
         <p:spPr>
           <a:xfrm>
-            <a:off x="311760" y="1152360"/>
+            <a:off x="312121" y="863730"/>
             <a:ext cx="3999600" cy="3416040"/>
           </a:xfrm>
           <a:prstGeom prst="rect">
@@ -19186,21 +19212,12 @@
                 <a:tab pos="0" algn="l"/>
               </a:tabLst>
             </a:pPr>
-            <a:r>
-              <a:rPr lang="en-US" sz="1400" b="0" strike="noStrike" spc="-1" dirty="0">
-                <a:solidFill>
-                  <a:srgbClr val="585858"/>
-                </a:solidFill>
-                <a:latin typeface="Arial"/>
-                <a:ea typeface="Arial"/>
-              </a:rPr>
-              <a:t># matches (out of 100): [insert # matches here]</a:t>
-            </a:r>
             <a:endParaRPr lang="en-US" sz="1400" b="0" strike="noStrike" spc="-1" dirty="0">
               <a:solidFill>
                 <a:srgbClr val="585858"/>
               </a:solidFill>
               <a:latin typeface="Arial"/>
+              <a:ea typeface="Arial"/>
             </a:endParaRPr>
           </a:p>
           <a:p>
@@ -19213,6 +19230,42 @@
                 <a:tab pos="0" algn="l"/>
               </a:tabLst>
             </a:pPr>
+            <a:endParaRPr lang="en-US" sz="1400" spc="-1" dirty="0">
+              <a:solidFill>
+                <a:srgbClr val="585858"/>
+              </a:solidFill>
+              <a:latin typeface="Arial"/>
+              <a:ea typeface="Arial"/>
+            </a:endParaRPr>
+          </a:p>
+          <a:p>
+            <a:pPr indent="0" defTabSz="914400">
+              <a:lnSpc>
+                <a:spcPct val="115000"/>
+              </a:lnSpc>
+              <a:buNone/>
+              <a:tabLst>
+                <a:tab pos="0" algn="l"/>
+              </a:tabLst>
+            </a:pPr>
+            <a:endParaRPr lang="en-US" sz="1400" b="0" strike="noStrike" spc="-1" dirty="0">
+              <a:solidFill>
+                <a:srgbClr val="585858"/>
+              </a:solidFill>
+              <a:latin typeface="Arial"/>
+              <a:ea typeface="Arial"/>
+            </a:endParaRPr>
+          </a:p>
+          <a:p>
+            <a:pPr indent="0" defTabSz="914400">
+              <a:lnSpc>
+                <a:spcPct val="115000"/>
+              </a:lnSpc>
+              <a:buNone/>
+              <a:tabLst>
+                <a:tab pos="0" algn="l"/>
+              </a:tabLst>
+            </a:pPr>
             <a:r>
               <a:rPr lang="en-US" sz="1400" b="0" strike="noStrike" spc="-1" dirty="0">
                 <a:solidFill>
@@ -19221,7 +19274,27 @@
                 <a:latin typeface="Arial"/>
                 <a:ea typeface="Arial"/>
               </a:rPr>
-              <a:t>Accuracy: [insert accuracy here]</a:t>
+              <a:t># matches (out of 100): [</a:t>
+            </a:r>
+            <a:r>
+              <a:rPr lang="en-US" sz="1400" b="0" strike="noStrike" spc="-1" dirty="0">
+                <a:solidFill>
+                  <a:srgbClr val="002060"/>
+                </a:solidFill>
+                <a:latin typeface="Arial"/>
+                <a:ea typeface="Arial"/>
+              </a:rPr>
+              <a:t>110</a:t>
+            </a:r>
+            <a:r>
+              <a:rPr lang="en-US" sz="1400" b="0" strike="noStrike" spc="-1" dirty="0">
+                <a:solidFill>
+                  <a:srgbClr val="585858"/>
+                </a:solidFill>
+                <a:latin typeface="Arial"/>
+                <a:ea typeface="Arial"/>
+              </a:rPr>
+              <a:t>]</a:t>
             </a:r>
             <a:endParaRPr lang="en-US" sz="1400" b="0" strike="noStrike" spc="-1" dirty="0">
               <a:solidFill>
@@ -19229,6 +19302,47 @@
               </a:solidFill>
               <a:latin typeface="Arial"/>
             </a:endParaRPr>
+          </a:p>
+          <a:p>
+            <a:pPr indent="0" defTabSz="914400">
+              <a:lnSpc>
+                <a:spcPct val="115000"/>
+              </a:lnSpc>
+              <a:buNone/>
+              <a:tabLst>
+                <a:tab pos="0" algn="l"/>
+              </a:tabLst>
+            </a:pPr>
+            <a:r>
+              <a:rPr lang="en-US" sz="1400" b="0" strike="noStrike" spc="-1" dirty="0">
+                <a:solidFill>
+                  <a:srgbClr val="585858"/>
+                </a:solidFill>
+                <a:latin typeface="Arial"/>
+                <a:ea typeface="Arial"/>
+              </a:rPr>
+              <a:t>Accuracy: [</a:t>
+            </a:r>
+            <a:r>
+              <a:rPr lang="en-US" sz="1400" b="0" strike="noStrike" spc="-1" dirty="0">
+                <a:solidFill>
+                  <a:srgbClr val="002060"/>
+                </a:solidFill>
+                <a:latin typeface="Arial"/>
+                <a:ea typeface="Arial"/>
+              </a:rPr>
+              <a:t>0.754545</a:t>
+            </a:r>
+            <a:r>
+              <a:rPr lang="en-US" sz="1400" b="0" strike="noStrike" spc="-1" dirty="0">
+                <a:solidFill>
+                  <a:srgbClr val="585858"/>
+                </a:solidFill>
+                <a:latin typeface="Arial"/>
+                <a:ea typeface="Arial"/>
+              </a:rPr>
+              <a:t>]</a:t>
+            </a:r>
           </a:p>
         </p:txBody>
       </p:sp>
@@ -19244,7 +19358,7 @@
         </p:nvSpPr>
         <p:spPr>
           <a:xfrm>
-            <a:off x="4832280" y="1152360"/>
+            <a:off x="4832281" y="863730"/>
             <a:ext cx="4096130" cy="3416040"/>
           </a:xfrm>
           <a:prstGeom prst="rect">
@@ -19450,21 +19564,12 @@
                 <a:tab pos="0" algn="l"/>
               </a:tabLst>
             </a:pPr>
-            <a:r>
-              <a:rPr lang="en-US" sz="1400" b="0" strike="noStrike" spc="-1" dirty="0">
-                <a:solidFill>
-                  <a:srgbClr val="585858"/>
-                </a:solidFill>
-                <a:latin typeface="Arial"/>
-                <a:ea typeface="Arial"/>
-              </a:rPr>
-              <a:t># matches: [insert # matches here]</a:t>
-            </a:r>
             <a:endParaRPr lang="en-US" sz="1400" b="0" strike="noStrike" spc="-1" dirty="0">
               <a:solidFill>
                 <a:srgbClr val="585858"/>
               </a:solidFill>
               <a:latin typeface="Arial"/>
+              <a:ea typeface="Arial"/>
             </a:endParaRPr>
           </a:p>
           <a:p>
@@ -19477,6 +19582,24 @@
                 <a:tab pos="0" algn="l"/>
               </a:tabLst>
             </a:pPr>
+            <a:endParaRPr lang="en-US" sz="1400" spc="-1" dirty="0">
+              <a:solidFill>
+                <a:srgbClr val="585858"/>
+              </a:solidFill>
+              <a:latin typeface="Arial"/>
+              <a:ea typeface="Arial"/>
+            </a:endParaRPr>
+          </a:p>
+          <a:p>
+            <a:pPr indent="0" defTabSz="914400">
+              <a:lnSpc>
+                <a:spcPct val="115000"/>
+              </a:lnSpc>
+              <a:buNone/>
+              <a:tabLst>
+                <a:tab pos="0" algn="l"/>
+              </a:tabLst>
+            </a:pPr>
             <a:r>
               <a:rPr lang="en-US" sz="1400" b="0" strike="noStrike" spc="-1" dirty="0">
                 <a:solidFill>
@@ -19485,7 +19608,84 @@
                 <a:latin typeface="Arial"/>
                 <a:ea typeface="Arial"/>
               </a:rPr>
-              <a:t>Accuracy: [insert accuracy here]</a:t>
+              <a:t># matches: [</a:t>
+            </a:r>
+            <a:r>
+              <a:rPr lang="en-US" sz="1400" spc="-1" dirty="0">
+                <a:solidFill>
+                  <a:srgbClr val="002060"/>
+                </a:solidFill>
+                <a:latin typeface="Arial"/>
+                <a:ea typeface="Arial"/>
+              </a:rPr>
+              <a:t>10</a:t>
+            </a:r>
+            <a:r>
+              <a:rPr lang="en-US" sz="1400" b="0" strike="noStrike" spc="-1" dirty="0">
+                <a:solidFill>
+                  <a:srgbClr val="002060"/>
+                </a:solidFill>
+                <a:latin typeface="Arial"/>
+                <a:ea typeface="Arial"/>
+              </a:rPr>
+              <a:t>4</a:t>
+            </a:r>
+            <a:r>
+              <a:rPr lang="en-US" sz="1400" b="0" strike="noStrike" spc="-1" dirty="0">
+                <a:solidFill>
+                  <a:srgbClr val="585858"/>
+                </a:solidFill>
+                <a:latin typeface="Arial"/>
+                <a:ea typeface="Arial"/>
+              </a:rPr>
+              <a:t>]</a:t>
+            </a:r>
+            <a:endParaRPr lang="en-US" sz="1400" b="0" strike="noStrike" spc="-1" dirty="0">
+              <a:solidFill>
+                <a:srgbClr val="585858"/>
+              </a:solidFill>
+              <a:latin typeface="Arial"/>
+            </a:endParaRPr>
+          </a:p>
+          <a:p>
+            <a:pPr indent="0" defTabSz="914400">
+              <a:lnSpc>
+                <a:spcPct val="115000"/>
+              </a:lnSpc>
+              <a:buNone/>
+              <a:tabLst>
+                <a:tab pos="0" algn="l"/>
+              </a:tabLst>
+            </a:pPr>
+            <a:r>
+              <a:rPr lang="en-US" sz="1400" b="0" strike="noStrike" spc="-1" dirty="0">
+                <a:solidFill>
+                  <a:srgbClr val="585858"/>
+                </a:solidFill>
+                <a:latin typeface="Arial"/>
+                <a:ea typeface="Arial"/>
+              </a:rPr>
+              <a:t>Accuracy: [</a:t>
+            </a:r>
+            <a:r>
+              <a:rPr lang="en-US" sz="1400" b="0" strike="noStrike" spc="-1" dirty="0">
+                <a:solidFill>
+                  <a:srgbClr val="002060"/>
+                </a:solidFill>
+                <a:latin typeface="Arial"/>
+                <a:ea typeface="Arial"/>
+              </a:rPr>
+              <a:t>0.740385</a:t>
+            </a:r>
+            <a:r>
+              <a:rPr lang="en-US" sz="1400" b="0" strike="noStrike" spc="-1" dirty="0">
+                <a:solidFill>
+                  <a:srgbClr val="585858"/>
+                </a:solidFill>
+                <a:latin typeface="Arial"/>
+                <a:ea typeface="Arial"/>
+              </a:rPr>
+              <a:t>]</a:t>
             </a:r>
             <a:endParaRPr lang="en-US" sz="1400" b="0" strike="noStrike" spc="-1" dirty="0">
               <a:solidFill>
@@ -19496,6 +19696,66 @@
           </a:p>
         </p:txBody>
       </p:sp>
+      <p:pic>
+        <p:nvPicPr>
+          <p:cNvPr id="2" name="Picture 1">
+            <a:extLst>
+              <a:ext uri="{FF2B5EF4-FFF2-40B4-BE49-F238E27FC236}">
+                <a16:creationId xmlns:a16="http://schemas.microsoft.com/office/drawing/2014/main" id="{60CB5CA8-ED06-1842-854A-9ECFE2499A01}"/>
+              </a:ext>
+            </a:extLst>
+          </p:cNvPr>
+          <p:cNvPicPr>
+            <a:picLocks noChangeAspect="1"/>
+          </p:cNvPicPr>
+          <p:nvPr/>
+        </p:nvPicPr>
+        <p:blipFill>
+          <a:blip r:embed="rId2"/>
+          <a:stretch>
+            <a:fillRect/>
+          </a:stretch>
+        </p:blipFill>
+        <p:spPr>
+          <a:xfrm>
+            <a:off x="311760" y="1665253"/>
+            <a:ext cx="3564325" cy="2421564"/>
+          </a:xfrm>
+          <a:prstGeom prst="rect">
+            <a:avLst/>
+          </a:prstGeom>
+        </p:spPr>
+      </p:pic>
+      <p:pic>
+        <p:nvPicPr>
+          <p:cNvPr id="4" name="Picture 3">
+            <a:extLst>
+              <a:ext uri="{FF2B5EF4-FFF2-40B4-BE49-F238E27FC236}">
+                <a16:creationId xmlns:a16="http://schemas.microsoft.com/office/drawing/2014/main" id="{65757D50-61CA-704F-8C54-8218B3786216}"/>
+              </a:ext>
+            </a:extLst>
+          </p:cNvPr>
+          <p:cNvPicPr>
+            <a:picLocks noChangeAspect="1"/>
+          </p:cNvPicPr>
+          <p:nvPr/>
+        </p:nvPicPr>
+        <p:blipFill>
+          <a:blip r:embed="rId3"/>
+          <a:stretch>
+            <a:fillRect/>
+          </a:stretch>
+        </p:blipFill>
+        <p:spPr>
+          <a:xfrm>
+            <a:off x="3931920" y="1794933"/>
+            <a:ext cx="5212080" cy="2209800"/>
+          </a:xfrm>
+          <a:prstGeom prst="rect">
+            <a:avLst/>
+          </a:prstGeom>
+        </p:spPr>
+      </p:pic>
     </p:spTree>
   </p:cSld>
   <p:clrMapOvr>
@@ -19533,7 +19793,7 @@
         </p:nvSpPr>
         <p:spPr>
           <a:xfrm>
-            <a:off x="311760" y="444960"/>
+            <a:off x="311760" y="186015"/>
             <a:ext cx="8520120" cy="572400"/>
           </a:xfrm>
           <a:prstGeom prst="rect">
@@ -19560,7 +19820,7 @@
               </a:tabLst>
             </a:pPr>
             <a:r>
-              <a:rPr lang="en-US" sz="2300" b="0" strike="noStrike" spc="-1">
+              <a:rPr lang="en-US" sz="2300" b="0" strike="noStrike" spc="-1" dirty="0">
                 <a:solidFill>
                   <a:srgbClr val="000000"/>
                 </a:solidFill>
@@ -19569,7 +19829,7 @@
               </a:rPr>
               <a:t>Part 2: Feature matching</a:t>
             </a:r>
-            <a:endParaRPr lang="en-US" sz="2300" b="0" strike="noStrike" spc="-1">
+            <a:endParaRPr lang="en-US" sz="2300" b="0" strike="noStrike" spc="-1" dirty="0">
               <a:solidFill>
                 <a:srgbClr val="000000"/>
               </a:solidFill>
@@ -19590,7 +19850,7 @@
         </p:nvSpPr>
         <p:spPr>
           <a:xfrm>
-            <a:off x="311760" y="1152360"/>
+            <a:off x="312121" y="794074"/>
             <a:ext cx="3999600" cy="3416040"/>
           </a:xfrm>
           <a:prstGeom prst="rect">
@@ -19779,21 +20039,12 @@
                 <a:tab pos="0" algn="l"/>
               </a:tabLst>
             </a:pPr>
-            <a:r>
-              <a:rPr lang="en-US" sz="1400" b="0" strike="noStrike" spc="-1" dirty="0">
-                <a:solidFill>
-                  <a:srgbClr val="585858"/>
-                </a:solidFill>
-                <a:latin typeface="Arial"/>
-                <a:ea typeface="Arial"/>
-              </a:rPr>
-              <a:t># matches: [insert # matches here]</a:t>
-            </a:r>
             <a:endParaRPr lang="en-US" sz="1400" b="0" strike="noStrike" spc="-1" dirty="0">
               <a:solidFill>
                 <a:srgbClr val="585858"/>
               </a:solidFill>
               <a:latin typeface="Arial"/>
+              <a:ea typeface="Arial"/>
             </a:endParaRPr>
           </a:p>
           <a:p>
@@ -19806,6 +20057,42 @@
                 <a:tab pos="0" algn="l"/>
               </a:tabLst>
             </a:pPr>
+            <a:endParaRPr lang="en-US" sz="1400" spc="-1" dirty="0">
+              <a:solidFill>
+                <a:srgbClr val="585858"/>
+              </a:solidFill>
+              <a:latin typeface="Arial"/>
+              <a:ea typeface="Arial"/>
+            </a:endParaRPr>
+          </a:p>
+          <a:p>
+            <a:pPr indent="0" defTabSz="914400">
+              <a:lnSpc>
+                <a:spcPct val="115000"/>
+              </a:lnSpc>
+              <a:buNone/>
+              <a:tabLst>
+                <a:tab pos="0" algn="l"/>
+              </a:tabLst>
+            </a:pPr>
+            <a:endParaRPr lang="en-US" sz="1400" b="0" strike="noStrike" spc="-1" dirty="0">
+              <a:solidFill>
+                <a:srgbClr val="585858"/>
+              </a:solidFill>
+              <a:latin typeface="Arial"/>
+              <a:ea typeface="Arial"/>
+            </a:endParaRPr>
+          </a:p>
+          <a:p>
+            <a:pPr indent="0" defTabSz="914400">
+              <a:lnSpc>
+                <a:spcPct val="115000"/>
+              </a:lnSpc>
+              <a:buNone/>
+              <a:tabLst>
+                <a:tab pos="0" algn="l"/>
+              </a:tabLst>
+            </a:pPr>
             <a:r>
               <a:rPr lang="en-US" sz="1400" b="0" strike="noStrike" spc="-1" dirty="0">
                 <a:solidFill>
@@ -19814,7 +20101,74 @@
                 <a:latin typeface="Arial"/>
                 <a:ea typeface="Arial"/>
               </a:rPr>
-              <a:t>Accuracy: [insert accuracy here]</a:t>
+              <a:t># matches: [</a:t>
+            </a:r>
+            <a:r>
+              <a:rPr lang="en-US" sz="1400" b="0" strike="noStrike" spc="-1" dirty="0">
+                <a:solidFill>
+                  <a:srgbClr val="002060"/>
+                </a:solidFill>
+                <a:latin typeface="Arial"/>
+                <a:ea typeface="Arial"/>
+              </a:rPr>
+              <a:t>11</a:t>
+            </a:r>
+            <a:r>
+              <a:rPr lang="en-US" sz="1400" b="0" strike="noStrike" spc="-1" dirty="0">
+                <a:solidFill>
+                  <a:srgbClr val="585858"/>
+                </a:solidFill>
+                <a:latin typeface="Arial"/>
+                <a:ea typeface="Arial"/>
+              </a:rPr>
+              <a:t>]</a:t>
+            </a:r>
+            <a:endParaRPr lang="en-US" sz="1400" b="0" strike="noStrike" spc="-1" dirty="0">
+              <a:solidFill>
+                <a:srgbClr val="585858"/>
+              </a:solidFill>
+              <a:latin typeface="Arial"/>
+            </a:endParaRPr>
+          </a:p>
+          <a:p>
+            <a:pPr indent="0" defTabSz="914400">
+              <a:lnSpc>
+                <a:spcPct val="115000"/>
+              </a:lnSpc>
+              <a:buNone/>
+              <a:tabLst>
+                <a:tab pos="0" algn="l"/>
+              </a:tabLst>
+            </a:pPr>
+            <a:r>
+              <a:rPr lang="en-US" sz="1400" b="0" strike="noStrike" spc="-1" dirty="0">
+                <a:solidFill>
+                  <a:srgbClr val="585858"/>
+                </a:solidFill>
+                <a:latin typeface="Arial"/>
+                <a:ea typeface="Arial"/>
+              </a:rPr>
+              <a:t>Accuracy: [</a:t>
+            </a:r>
+            <a:r>
+              <a:rPr lang="en-US" sz="1400" b="0" strike="noStrike" spc="-1" dirty="0">
+                <a:solidFill>
+                  <a:srgbClr val="002060"/>
+                </a:solidFill>
+                <a:latin typeface="Arial"/>
+                <a:ea typeface="Arial"/>
+              </a:rPr>
+              <a:t>0.00</a:t>
+            </a:r>
+            <a:r>
+              <a:rPr lang="en-US" sz="1400" b="0" strike="noStrike" spc="-1" dirty="0">
+                <a:solidFill>
+                  <a:srgbClr val="585858"/>
+                </a:solidFill>
+                <a:latin typeface="Arial"/>
+                <a:ea typeface="Arial"/>
+              </a:rPr>
+              <a:t>]</a:t>
             </a:r>
             <a:endParaRPr lang="en-US" sz="1400" b="0" strike="noStrike" spc="-1" dirty="0">
               <a:solidFill>
@@ -19837,7 +20191,7 @@
         </p:nvSpPr>
         <p:spPr>
           <a:xfrm>
-            <a:off x="4832280" y="1152360"/>
+            <a:off x="4832281" y="863730"/>
             <a:ext cx="3999600" cy="3416040"/>
           </a:xfrm>
           <a:prstGeom prst="rect">
@@ -19863,11 +20217,9 @@
               </a:tabLst>
             </a:pPr>
             <a:r>
-              <a:rPr lang="en-US" sz="1400" b="0" strike="noStrike" spc="-1" dirty="0">
-                <a:solidFill>
-                  <a:schemeClr val="tx2">
-                    <a:lumMod val="50000"/>
-                  </a:schemeClr>
+              <a:rPr lang="en-US" sz="1200" b="0" strike="noStrike" spc="-1" dirty="0">
+                <a:solidFill>
+                  <a:srgbClr val="002060"/>
                 </a:solidFill>
                 <a:latin typeface="Arial"/>
                 <a:ea typeface="Arial"/>
@@ -19875,11 +20227,9 @@
               <a:t>[How does your implementation of </a:t>
             </a:r>
             <a:r>
-              <a:rPr lang="en-US" sz="1400" b="0" i="1" strike="noStrike" spc="-1" dirty="0" err="1">
-                <a:solidFill>
-                  <a:schemeClr val="tx2">
-                    <a:lumMod val="50000"/>
-                  </a:schemeClr>
+              <a:rPr lang="en-US" sz="1200" b="0" i="1" strike="noStrike" spc="-1" dirty="0" err="1">
+                <a:solidFill>
+                  <a:srgbClr val="002060"/>
                 </a:solidFill>
                 <a:latin typeface="Arial"/>
                 <a:ea typeface="Arial"/>
@@ -19887,11 +20237,9 @@
               <a:t>match_features_ratio_test</a:t>
             </a:r>
             <a:r>
-              <a:rPr lang="en-US" sz="1400" b="0" i="1" strike="noStrike" spc="-1" dirty="0">
-                <a:solidFill>
-                  <a:schemeClr val="tx2">
-                    <a:lumMod val="50000"/>
-                  </a:schemeClr>
+              <a:rPr lang="en-US" sz="1200" b="0" i="1" strike="noStrike" spc="-1" dirty="0">
+                <a:solidFill>
+                  <a:srgbClr val="002060"/>
                 </a:solidFill>
                 <a:latin typeface="Arial"/>
                 <a:ea typeface="Arial"/>
@@ -19899,28 +20247,83 @@
               <a:t> </a:t>
             </a:r>
             <a:r>
-              <a:rPr lang="en-US" sz="1400" b="0" strike="noStrike" spc="-1" dirty="0">
-                <a:solidFill>
-                  <a:schemeClr val="tx2">
-                    <a:lumMod val="50000"/>
-                  </a:schemeClr>
+              <a:rPr lang="en-US" sz="1200" b="0" strike="noStrike" spc="-1" dirty="0">
+                <a:solidFill>
+                  <a:srgbClr val="002060"/>
                 </a:solidFill>
                 <a:latin typeface="Arial"/>
                 <a:ea typeface="Arial"/>
               </a:rPr>
               <a:t>filter and structure feature matches? What is the significance of the confidence score?]</a:t>
             </a:r>
-            <a:endParaRPr lang="en-US" sz="1400" b="0" strike="noStrike" spc="-1" dirty="0">
-              <a:solidFill>
-                <a:schemeClr val="tx2">
-                  <a:lumMod val="50000"/>
-                </a:schemeClr>
+          </a:p>
+          <a:p>
+            <a:pPr>
+              <a:lnSpc>
+                <a:spcPct val="115000"/>
+              </a:lnSpc>
+              <a:tabLst>
+                <a:tab pos="0" algn="l"/>
+              </a:tabLst>
+            </a:pPr>
+            <a:endParaRPr lang="en-US" sz="1200" spc="-1" dirty="0">
+              <a:solidFill>
+                <a:srgbClr val="002060"/>
               </a:solidFill>
               <a:latin typeface="Arial"/>
             </a:endParaRPr>
+          </a:p>
+          <a:p>
+            <a:pPr>
+              <a:lnSpc>
+                <a:spcPct val="115000"/>
+              </a:lnSpc>
+              <a:tabLst>
+                <a:tab pos="0" algn="l"/>
+              </a:tabLst>
+            </a:pPr>
+            <a:r>
+              <a:rPr lang="en-US" sz="1200" spc="-1" dirty="0">
+                <a:solidFill>
+                  <a:srgbClr val="002060"/>
+                </a:solidFill>
+                <a:latin typeface="Arial"/>
+              </a:rPr>
+              <a:t>While the first 2 images (Notre Dam and Mount Rushmore) have decent accuracies, the Gaudi Image fails in the Harris Corner Detector method. What we can infer from the confidence score (accuracy) is that the Harris Corner Detector isn’t scale-invariant. The first 2 images work decently because there isn’t much of a difference in the view-point and scale in them. The low accuracy (0.00) in the Gaudi image corresponds to what is a significant difference in camera zoom, size of features, etc. </a:t>
+            </a:r>
           </a:p>
         </p:txBody>
       </p:sp>
+      <p:pic>
+        <p:nvPicPr>
+          <p:cNvPr id="3" name="Picture 2">
+            <a:extLst>
+              <a:ext uri="{FF2B5EF4-FFF2-40B4-BE49-F238E27FC236}">
+                <a16:creationId xmlns:a16="http://schemas.microsoft.com/office/drawing/2014/main" id="{B6572BA0-AD4A-C749-9670-24D67957521E}"/>
+              </a:ext>
+            </a:extLst>
+          </p:cNvPr>
+          <p:cNvPicPr>
+            <a:picLocks noChangeAspect="1"/>
+          </p:cNvPicPr>
+          <p:nvPr/>
+        </p:nvPicPr>
+        <p:blipFill>
+          <a:blip r:embed="rId2"/>
+          <a:stretch>
+            <a:fillRect/>
+          </a:stretch>
+        </p:blipFill>
+        <p:spPr>
+          <a:xfrm>
+            <a:off x="80433" y="1407583"/>
+            <a:ext cx="4292600" cy="1955800"/>
+          </a:xfrm>
+          <a:prstGeom prst="rect">
+            <a:avLst/>
+          </a:prstGeom>
+        </p:spPr>
+      </p:pic>
     </p:spTree>
   </p:cSld>
   <p:clrMapOvr>
@@ -20033,8 +20436,8 @@
         </p:nvSpPr>
         <p:spPr>
           <a:xfrm>
-            <a:off x="311760" y="1148862"/>
-            <a:ext cx="8520120" cy="1946030"/>
+            <a:off x="311760" y="1148861"/>
+            <a:ext cx="8520120" cy="3649715"/>
           </a:xfrm>
           <a:prstGeom prst="rect">
             <a:avLst/>
@@ -20062,7 +20465,7 @@
               </a:tabLst>
             </a:pPr>
             <a:r>
-              <a:rPr lang="en-US" sz="1800" b="0" strike="noStrike" spc="-1" dirty="0">
+              <a:rPr lang="en-US" sz="1400" b="0" strike="noStrike" spc="-1" dirty="0">
                 <a:solidFill>
                   <a:schemeClr val="tx2">
                     <a:lumMod val="50000"/>
@@ -20073,11 +20476,58 @@
               </a:rPr>
               <a:t>[Why do feature matches that easily pass the nearest neighbor distance ratio (NNDR) test tend to be more accurate?]</a:t>
             </a:r>
-            <a:endParaRPr lang="en-US" sz="1800" b="0" strike="noStrike" spc="-1" dirty="0">
-              <a:solidFill>
-                <a:schemeClr val="tx2">
-                  <a:lumMod val="50000"/>
-                </a:schemeClr>
+          </a:p>
+          <a:p>
+            <a:pPr>
+              <a:lnSpc>
+                <a:spcPct val="115000"/>
+              </a:lnSpc>
+              <a:spcBef>
+                <a:spcPts val="1599"/>
+              </a:spcBef>
+              <a:tabLst>
+                <a:tab pos="0" algn="l"/>
+              </a:tabLst>
+            </a:pPr>
+            <a:r>
+              <a:rPr lang="en-US" sz="1400" b="0" strike="noStrike" spc="-1" dirty="0">
+                <a:solidFill>
+                  <a:srgbClr val="002060"/>
+                </a:solidFill>
+                <a:latin typeface="Arial"/>
+              </a:rPr>
+              <a:t>Feature Matches tha</a:t>
+            </a:r>
+            <a:r>
+              <a:rPr lang="en-US" sz="1400" spc="-1" dirty="0">
+                <a:solidFill>
+                  <a:srgbClr val="002060"/>
+                </a:solidFill>
+                <a:latin typeface="Arial"/>
+              </a:rPr>
+              <a:t>t easily pass the NNDR test tend to be more accurate because the test is a good measure of the feature’s uniqueness and distinctiveness. If the ratio is very low, it implies the next closest match is much further away, allowing us to </a:t>
+            </a:r>
+            <a:r>
+              <a:rPr lang="en-US" sz="1400" spc="-1" dirty="0" err="1">
+                <a:solidFill>
+                  <a:srgbClr val="002060"/>
+                </a:solidFill>
+                <a:latin typeface="Arial"/>
+              </a:rPr>
+              <a:t>finalise</a:t>
+            </a:r>
+            <a:r>
+              <a:rPr lang="en-US" sz="1400" spc="-1" dirty="0">
+                <a:solidFill>
+                  <a:srgbClr val="002060"/>
+                </a:solidFill>
+                <a:latin typeface="Arial"/>
+              </a:rPr>
+              <a:t> a match without much contention from the next neighbors. By acting as a confidence filter, NNDR discards ambiguous matches, while keeping only the most reliable correspondences, which drastically increases the overall accuracy of the final set of matches. </a:t>
+            </a:r>
+            <a:endParaRPr lang="en-US" sz="1400" b="0" strike="noStrike" spc="-1" dirty="0">
+              <a:solidFill>
+                <a:srgbClr val="002060"/>
               </a:solidFill>
               <a:latin typeface="Arial"/>
             </a:endParaRPr>
@@ -20126,7 +20576,7 @@
         </p:nvSpPr>
         <p:spPr>
           <a:xfrm>
-            <a:off x="311760" y="444960"/>
+            <a:off x="311940" y="158760"/>
             <a:ext cx="8520120" cy="572400"/>
           </a:xfrm>
           <a:prstGeom prst="rect">
@@ -20183,7 +20633,7 @@
         </p:nvSpPr>
         <p:spPr>
           <a:xfrm>
-            <a:off x="311760" y="1152360"/>
+            <a:off x="311760" y="748987"/>
             <a:ext cx="3999600" cy="3416040"/>
           </a:xfrm>
           <a:prstGeom prst="rect">
@@ -20240,7 +20690,7 @@
         </p:nvSpPr>
         <p:spPr>
           <a:xfrm>
-            <a:off x="4832280" y="1152360"/>
+            <a:off x="4832460" y="555736"/>
             <a:ext cx="3999600" cy="3416040"/>
           </a:xfrm>
           <a:prstGeom prst="rect">
@@ -20429,21 +20879,12 @@
                 <a:tab pos="0" algn="l"/>
               </a:tabLst>
             </a:pPr>
-            <a:r>
-              <a:rPr lang="en-US" sz="1400" b="0" strike="noStrike" spc="-1" dirty="0">
-                <a:solidFill>
-                  <a:srgbClr val="585858"/>
-                </a:solidFill>
-                <a:latin typeface="Arial"/>
-                <a:ea typeface="Arial"/>
-              </a:rPr>
-              <a:t># matches (out of 100): [insert # matches here]</a:t>
-            </a:r>
             <a:endParaRPr lang="en-US" sz="1400" b="0" strike="noStrike" spc="-1" dirty="0">
               <a:solidFill>
                 <a:srgbClr val="585858"/>
               </a:solidFill>
               <a:latin typeface="Arial"/>
+              <a:ea typeface="Arial"/>
             </a:endParaRPr>
           </a:p>
           <a:p>
@@ -20456,6 +20897,42 @@
                 <a:tab pos="0" algn="l"/>
               </a:tabLst>
             </a:pPr>
+            <a:endParaRPr lang="en-US" sz="1400" spc="-1" dirty="0">
+              <a:solidFill>
+                <a:srgbClr val="585858"/>
+              </a:solidFill>
+              <a:latin typeface="Arial"/>
+              <a:ea typeface="Arial"/>
+            </a:endParaRPr>
+          </a:p>
+          <a:p>
+            <a:pPr indent="0" defTabSz="914400">
+              <a:lnSpc>
+                <a:spcPct val="115000"/>
+              </a:lnSpc>
+              <a:buNone/>
+              <a:tabLst>
+                <a:tab pos="0" algn="l"/>
+              </a:tabLst>
+            </a:pPr>
+            <a:endParaRPr lang="en-US" sz="1400" b="0" strike="noStrike" spc="-1" dirty="0">
+              <a:solidFill>
+                <a:srgbClr val="585858"/>
+              </a:solidFill>
+              <a:latin typeface="Arial"/>
+              <a:ea typeface="Arial"/>
+            </a:endParaRPr>
+          </a:p>
+          <a:p>
+            <a:pPr indent="0" defTabSz="914400">
+              <a:lnSpc>
+                <a:spcPct val="115000"/>
+              </a:lnSpc>
+              <a:buNone/>
+              <a:tabLst>
+                <a:tab pos="0" algn="l"/>
+              </a:tabLst>
+            </a:pPr>
             <a:r>
               <a:rPr lang="en-US" sz="1400" b="0" strike="noStrike" spc="-1" dirty="0">
                 <a:solidFill>
@@ -20464,7 +20941,74 @@
                 <a:latin typeface="Arial"/>
                 <a:ea typeface="Arial"/>
               </a:rPr>
-              <a:t>Accuracy: [insert accuracy here]</a:t>
+              <a:t># matches (out of 100): [</a:t>
+            </a:r>
+            <a:r>
+              <a:rPr lang="en-US" sz="1400" b="0" strike="noStrike" spc="-1" dirty="0">
+                <a:solidFill>
+                  <a:srgbClr val="002060"/>
+                </a:solidFill>
+                <a:latin typeface="Arial"/>
+                <a:ea typeface="Arial"/>
+              </a:rPr>
+              <a:t>191</a:t>
+            </a:r>
+            <a:r>
+              <a:rPr lang="en-US" sz="1400" b="0" strike="noStrike" spc="-1" dirty="0">
+                <a:solidFill>
+                  <a:srgbClr val="585858"/>
+                </a:solidFill>
+                <a:latin typeface="Arial"/>
+                <a:ea typeface="Arial"/>
+              </a:rPr>
+              <a:t>]</a:t>
+            </a:r>
+            <a:endParaRPr lang="en-US" sz="1400" b="0" strike="noStrike" spc="-1" dirty="0">
+              <a:solidFill>
+                <a:srgbClr val="585858"/>
+              </a:solidFill>
+              <a:latin typeface="Arial"/>
+            </a:endParaRPr>
+          </a:p>
+          <a:p>
+            <a:pPr indent="0" defTabSz="914400">
+              <a:lnSpc>
+                <a:spcPct val="115000"/>
+              </a:lnSpc>
+              <a:buNone/>
+              <a:tabLst>
+                <a:tab pos="0" algn="l"/>
+              </a:tabLst>
+            </a:pPr>
+            <a:r>
+              <a:rPr lang="en-US" sz="1400" b="0" strike="noStrike" spc="-1" dirty="0">
+                <a:solidFill>
+                  <a:srgbClr val="585858"/>
+                </a:solidFill>
+                <a:latin typeface="Arial"/>
+                <a:ea typeface="Arial"/>
+              </a:rPr>
+              <a:t>Accuracy: [</a:t>
+            </a:r>
+            <a:r>
+              <a:rPr lang="en-US" sz="1400" b="0" strike="noStrike" spc="-1" dirty="0">
+                <a:solidFill>
+                  <a:srgbClr val="002060"/>
+                </a:solidFill>
+                <a:latin typeface="Arial"/>
+                <a:ea typeface="Arial"/>
+              </a:rPr>
+              <a:t>0.926702</a:t>
+            </a:r>
+            <a:r>
+              <a:rPr lang="en-US" sz="1400" b="0" strike="noStrike" spc="-1" dirty="0">
+                <a:solidFill>
+                  <a:srgbClr val="585858"/>
+                </a:solidFill>
+                <a:latin typeface="Arial"/>
+                <a:ea typeface="Arial"/>
+              </a:rPr>
+              <a:t>]</a:t>
             </a:r>
             <a:endParaRPr lang="en-US" sz="1400" b="0" strike="noStrike" spc="-1" dirty="0">
               <a:solidFill>
@@ -20475,6 +21019,66 @@
           </a:p>
         </p:txBody>
       </p:sp>
+      <p:pic>
+        <p:nvPicPr>
+          <p:cNvPr id="2" name="Picture 1">
+            <a:extLst>
+              <a:ext uri="{FF2B5EF4-FFF2-40B4-BE49-F238E27FC236}">
+                <a16:creationId xmlns:a16="http://schemas.microsoft.com/office/drawing/2014/main" id="{1F7FD25A-C820-914D-903A-366510DA9424}"/>
+              </a:ext>
+            </a:extLst>
+          </p:cNvPr>
+          <p:cNvPicPr>
+            <a:picLocks noChangeAspect="1"/>
+          </p:cNvPicPr>
+          <p:nvPr/>
+        </p:nvPicPr>
+        <p:blipFill>
+          <a:blip r:embed="rId2"/>
+          <a:stretch>
+            <a:fillRect/>
+          </a:stretch>
+        </p:blipFill>
+        <p:spPr>
+          <a:xfrm>
+            <a:off x="627381" y="1433587"/>
+            <a:ext cx="2402840" cy="3432628"/>
+          </a:xfrm>
+          <a:prstGeom prst="rect">
+            <a:avLst/>
+          </a:prstGeom>
+        </p:spPr>
+      </p:pic>
+      <p:pic>
+        <p:nvPicPr>
+          <p:cNvPr id="3" name="Picture 2">
+            <a:extLst>
+              <a:ext uri="{FF2B5EF4-FFF2-40B4-BE49-F238E27FC236}">
+                <a16:creationId xmlns:a16="http://schemas.microsoft.com/office/drawing/2014/main" id="{A7FEEAFB-A280-B544-B6D3-EC1F17A90011}"/>
+              </a:ext>
+            </a:extLst>
+          </p:cNvPr>
+          <p:cNvPicPr>
+            <a:picLocks noChangeAspect="1"/>
+          </p:cNvPicPr>
+          <p:nvPr/>
+        </p:nvPicPr>
+        <p:blipFill>
+          <a:blip r:embed="rId3"/>
+          <a:stretch>
+            <a:fillRect/>
+          </a:stretch>
+        </p:blipFill>
+        <p:spPr>
+          <a:xfrm>
+            <a:off x="4660897" y="1441450"/>
+            <a:ext cx="3822701" cy="2597102"/>
+          </a:xfrm>
+          <a:prstGeom prst="rect">
+            <a:avLst/>
+          </a:prstGeom>
+        </p:spPr>
+      </p:pic>
     </p:spTree>
   </p:cSld>
   <p:clrMapOvr>
@@ -20512,7 +21116,7 @@
         </p:nvSpPr>
         <p:spPr>
           <a:xfrm>
-            <a:off x="311760" y="444960"/>
+            <a:off x="311760" y="114760"/>
             <a:ext cx="8520120" cy="572400"/>
           </a:xfrm>
           <a:prstGeom prst="rect">
@@ -20539,7 +21143,7 @@
               </a:tabLst>
             </a:pPr>
             <a:r>
-              <a:rPr lang="en-US" sz="2300" b="0" strike="noStrike" spc="-1">
+              <a:rPr lang="en-US" sz="2300" b="0" strike="noStrike" spc="-1" dirty="0">
                 <a:solidFill>
                   <a:srgbClr val="000000"/>
                 </a:solidFill>
@@ -20548,7 +21152,7 @@
               </a:rPr>
               <a:t>Part 3: SIFT feature descriptor</a:t>
             </a:r>
-            <a:endParaRPr lang="en-US" sz="2300" b="0" strike="noStrike" spc="-1">
+            <a:endParaRPr lang="en-US" sz="2300" b="0" strike="noStrike" spc="-1" dirty="0">
               <a:solidFill>
                 <a:srgbClr val="000000"/>
               </a:solidFill>
@@ -20569,7 +21173,7 @@
         </p:nvSpPr>
         <p:spPr>
           <a:xfrm>
-            <a:off x="311760" y="1152360"/>
+            <a:off x="312121" y="687160"/>
             <a:ext cx="3999600" cy="3416040"/>
           </a:xfrm>
           <a:prstGeom prst="rect">
@@ -20775,21 +21379,12 @@
                 <a:tab pos="0" algn="l"/>
               </a:tabLst>
             </a:pPr>
-            <a:r>
-              <a:rPr lang="en-US" sz="1400" b="0" strike="noStrike" spc="-1" dirty="0">
-                <a:solidFill>
-                  <a:srgbClr val="585858"/>
-                </a:solidFill>
-                <a:latin typeface="Arial"/>
-                <a:ea typeface="Arial"/>
-              </a:rPr>
-              <a:t># matches: [insert # matches here]</a:t>
-            </a:r>
             <a:endParaRPr lang="en-US" sz="1400" b="0" strike="noStrike" spc="-1" dirty="0">
               <a:solidFill>
                 <a:srgbClr val="585858"/>
               </a:solidFill>
               <a:latin typeface="Arial"/>
+              <a:ea typeface="Arial"/>
             </a:endParaRPr>
           </a:p>
           <a:p>
@@ -20802,6 +21397,42 @@
                 <a:tab pos="0" algn="l"/>
               </a:tabLst>
             </a:pPr>
+            <a:endParaRPr lang="en-US" sz="1400" spc="-1" dirty="0">
+              <a:solidFill>
+                <a:srgbClr val="585858"/>
+              </a:solidFill>
+              <a:latin typeface="Arial"/>
+              <a:ea typeface="Arial"/>
+            </a:endParaRPr>
+          </a:p>
+          <a:p>
+            <a:pPr indent="0" defTabSz="914400">
+              <a:lnSpc>
+                <a:spcPct val="115000"/>
+              </a:lnSpc>
+              <a:buNone/>
+              <a:tabLst>
+                <a:tab pos="0" algn="l"/>
+              </a:tabLst>
+            </a:pPr>
+            <a:endParaRPr lang="en-US" sz="1400" b="0" strike="noStrike" spc="-1" dirty="0">
+              <a:solidFill>
+                <a:srgbClr val="585858"/>
+              </a:solidFill>
+              <a:latin typeface="Arial"/>
+              <a:ea typeface="Arial"/>
+            </a:endParaRPr>
+          </a:p>
+          <a:p>
+            <a:pPr indent="0" defTabSz="914400">
+              <a:lnSpc>
+                <a:spcPct val="115000"/>
+              </a:lnSpc>
+              <a:buNone/>
+              <a:tabLst>
+                <a:tab pos="0" algn="l"/>
+              </a:tabLst>
+            </a:pPr>
             <a:r>
               <a:rPr lang="en-US" sz="1400" b="0" strike="noStrike" spc="-1" dirty="0">
                 <a:solidFill>
@@ -20810,7 +21441,74 @@
                 <a:latin typeface="Arial"/>
                 <a:ea typeface="Arial"/>
               </a:rPr>
-              <a:t>Accuracy: [insert accuracy here]</a:t>
+              <a:t># matches: [</a:t>
+            </a:r>
+            <a:r>
+              <a:rPr lang="en-US" sz="1400" b="0" strike="noStrike" spc="-1" dirty="0">
+                <a:solidFill>
+                  <a:srgbClr val="002060"/>
+                </a:solidFill>
+                <a:latin typeface="Arial"/>
+                <a:ea typeface="Arial"/>
+              </a:rPr>
+              <a:t>182</a:t>
+            </a:r>
+            <a:r>
+              <a:rPr lang="en-US" sz="1400" b="0" strike="noStrike" spc="-1" dirty="0">
+                <a:solidFill>
+                  <a:srgbClr val="585858"/>
+                </a:solidFill>
+                <a:latin typeface="Arial"/>
+                <a:ea typeface="Arial"/>
+              </a:rPr>
+              <a:t>]</a:t>
+            </a:r>
+            <a:endParaRPr lang="en-US" sz="1400" b="0" strike="noStrike" spc="-1" dirty="0">
+              <a:solidFill>
+                <a:srgbClr val="585858"/>
+              </a:solidFill>
+              <a:latin typeface="Arial"/>
+            </a:endParaRPr>
+          </a:p>
+          <a:p>
+            <a:pPr indent="0" defTabSz="914400">
+              <a:lnSpc>
+                <a:spcPct val="115000"/>
+              </a:lnSpc>
+              <a:buNone/>
+              <a:tabLst>
+                <a:tab pos="0" algn="l"/>
+              </a:tabLst>
+            </a:pPr>
+            <a:r>
+              <a:rPr lang="en-US" sz="1400" b="0" strike="noStrike" spc="-1" dirty="0">
+                <a:solidFill>
+                  <a:srgbClr val="585858"/>
+                </a:solidFill>
+                <a:latin typeface="Arial"/>
+                <a:ea typeface="Arial"/>
+              </a:rPr>
+              <a:t>Accuracy: [</a:t>
+            </a:r>
+            <a:r>
+              <a:rPr lang="en-US" sz="1400" b="0" strike="noStrike" spc="-1" dirty="0">
+                <a:solidFill>
+                  <a:srgbClr val="002060"/>
+                </a:solidFill>
+                <a:latin typeface="Arial"/>
+                <a:ea typeface="Arial"/>
+              </a:rPr>
+              <a:t>0.934066</a:t>
+            </a:r>
+            <a:r>
+              <a:rPr lang="en-US" sz="1400" b="0" strike="noStrike" spc="-1" dirty="0">
+                <a:solidFill>
+                  <a:srgbClr val="585858"/>
+                </a:solidFill>
+                <a:latin typeface="Arial"/>
+                <a:ea typeface="Arial"/>
+              </a:rPr>
+              <a:t>]</a:t>
             </a:r>
             <a:endParaRPr lang="en-US" sz="1400" b="0" strike="noStrike" spc="-1" dirty="0">
               <a:solidFill>
@@ -21047,7 +21745,27 @@
                 <a:latin typeface="Arial"/>
                 <a:ea typeface="Arial"/>
               </a:rPr>
-              <a:t># matches: [insert # matches here]</a:t>
+              <a:t># matches: [</a:t>
+            </a:r>
+            <a:r>
+              <a:rPr lang="en-US" sz="1400" b="0" strike="noStrike" spc="-1" dirty="0">
+                <a:solidFill>
+                  <a:srgbClr val="002060"/>
+                </a:solidFill>
+                <a:latin typeface="Arial"/>
+                <a:ea typeface="Arial"/>
+              </a:rPr>
+              <a:t>3</a:t>
+            </a:r>
+            <a:r>
+              <a:rPr lang="en-US" sz="1400" b="0" strike="noStrike" spc="-1" dirty="0">
+                <a:solidFill>
+                  <a:srgbClr val="585858"/>
+                </a:solidFill>
+                <a:latin typeface="Arial"/>
+                <a:ea typeface="Arial"/>
+              </a:rPr>
+              <a:t>]</a:t>
             </a:r>
             <a:endParaRPr lang="en-US" sz="1400" b="0" strike="noStrike" spc="-1" dirty="0">
               <a:solidFill>
@@ -21074,7 +21792,27 @@
                 <a:latin typeface="Arial"/>
                 <a:ea typeface="Arial"/>
               </a:rPr>
-              <a:t>Accuracy: [insert accuracy here]</a:t>
+              <a:t>Accuracy: [</a:t>
+            </a:r>
+            <a:r>
+              <a:rPr lang="en-US" sz="1400" b="0" strike="noStrike" spc="-1" dirty="0">
+                <a:solidFill>
+                  <a:srgbClr val="002060"/>
+                </a:solidFill>
+                <a:latin typeface="Arial"/>
+                <a:ea typeface="Arial"/>
+              </a:rPr>
+              <a:t>0.00</a:t>
+            </a:r>
+            <a:r>
+              <a:rPr lang="en-US" sz="1400" b="0" strike="noStrike" spc="-1" dirty="0">
+                <a:solidFill>
+                  <a:srgbClr val="585858"/>
+                </a:solidFill>
+                <a:latin typeface="Arial"/>
+                <a:ea typeface="Arial"/>
+              </a:rPr>
+              <a:t>]</a:t>
             </a:r>
             <a:endParaRPr lang="en-US" sz="1400" b="0" strike="noStrike" spc="-1" dirty="0">
               <a:solidFill>
@@ -21085,6 +21823,66 @@
           </a:p>
         </p:txBody>
       </p:sp>
+      <p:pic>
+        <p:nvPicPr>
+          <p:cNvPr id="2" name="Picture 1">
+            <a:extLst>
+              <a:ext uri="{FF2B5EF4-FFF2-40B4-BE49-F238E27FC236}">
+                <a16:creationId xmlns:a16="http://schemas.microsoft.com/office/drawing/2014/main" id="{6D15E4F3-8D49-BD47-BCCB-45629B5C6915}"/>
+              </a:ext>
+            </a:extLst>
+          </p:cNvPr>
+          <p:cNvPicPr>
+            <a:picLocks noChangeAspect="1"/>
+          </p:cNvPicPr>
+          <p:nvPr/>
+        </p:nvPicPr>
+        <p:blipFill>
+          <a:blip r:embed="rId2"/>
+          <a:stretch>
+            <a:fillRect/>
+          </a:stretch>
+        </p:blipFill>
+        <p:spPr>
+          <a:xfrm>
+            <a:off x="0" y="1634068"/>
+            <a:ext cx="4732808" cy="2006600"/>
+          </a:xfrm>
+          <a:prstGeom prst="rect">
+            <a:avLst/>
+          </a:prstGeom>
+        </p:spPr>
+      </p:pic>
+      <p:pic>
+        <p:nvPicPr>
+          <p:cNvPr id="4" name="Picture 3">
+            <a:extLst>
+              <a:ext uri="{FF2B5EF4-FFF2-40B4-BE49-F238E27FC236}">
+                <a16:creationId xmlns:a16="http://schemas.microsoft.com/office/drawing/2014/main" id="{E12886D0-E060-6C48-87D3-98E6C75D251A}"/>
+              </a:ext>
+            </a:extLst>
+          </p:cNvPr>
+          <p:cNvPicPr>
+            <a:picLocks noChangeAspect="1"/>
+          </p:cNvPicPr>
+          <p:nvPr/>
+        </p:nvPicPr>
+        <p:blipFill>
+          <a:blip r:embed="rId3"/>
+          <a:stretch>
+            <a:fillRect/>
+          </a:stretch>
+        </p:blipFill>
+        <p:spPr>
+          <a:xfrm>
+            <a:off x="4794792" y="1717676"/>
+            <a:ext cx="4037087" cy="1839383"/>
+          </a:xfrm>
+          <a:prstGeom prst="rect">
+            <a:avLst/>
+          </a:prstGeom>
+        </p:spPr>
+      </p:pic>
     </p:spTree>
   </p:cSld>
   <p:clrMapOvr>
@@ -22191,8 +22989,8 @@
         </p:nvSpPr>
         <p:spPr>
           <a:xfrm>
-            <a:off x="311760" y="1152360"/>
-            <a:ext cx="3999600" cy="3416040"/>
+            <a:off x="311760" y="906308"/>
+            <a:ext cx="3999600" cy="4151214"/>
           </a:xfrm>
           <a:prstGeom prst="rect">
             <a:avLst/>
@@ -22218,7 +23016,7 @@
               </a:tabLst>
             </a:pPr>
             <a:r>
-              <a:rPr lang="en-US" sz="1400" b="0" strike="noStrike" spc="-1" dirty="0">
+              <a:rPr lang="en-US" sz="1200" b="0" strike="noStrike" spc="-1" dirty="0">
                 <a:solidFill>
                   <a:srgbClr val="585858"/>
                 </a:solidFill>
@@ -22228,7 +23026,7 @@
               <a:t>[insert visualization of \sqrt(I</a:t>
             </a:r>
             <a:r>
-              <a:rPr lang="en-US" sz="1400" b="0" strike="noStrike" spc="-1" baseline="-25000" dirty="0">
+              <a:rPr lang="en-US" sz="1200" b="0" strike="noStrike" spc="-1" baseline="-25000" dirty="0">
                 <a:solidFill>
                   <a:srgbClr val="585858"/>
                 </a:solidFill>
@@ -22238,7 +23036,7 @@
               <a:t>x</a:t>
             </a:r>
             <a:r>
-              <a:rPr lang="en-US" sz="1400" b="0" strike="noStrike" spc="-1" baseline="30000" dirty="0">
+              <a:rPr lang="en-US" sz="1200" b="0" strike="noStrike" spc="-1" baseline="30000" dirty="0">
                 <a:solidFill>
                   <a:srgbClr val="585858"/>
                 </a:solidFill>
@@ -22248,7 +23046,7 @@
               <a:t>2</a:t>
             </a:r>
             <a:r>
-              <a:rPr lang="en-US" sz="1400" b="0" strike="noStrike" spc="-1" dirty="0">
+              <a:rPr lang="en-US" sz="1200" b="0" strike="noStrike" spc="-1" dirty="0">
                 <a:solidFill>
                   <a:srgbClr val="585858"/>
                 </a:solidFill>
@@ -22258,7 +23056,7 @@
               <a:t> + I</a:t>
             </a:r>
             <a:r>
-              <a:rPr lang="en-US" sz="1400" b="0" strike="noStrike" spc="-1" baseline="-25000" dirty="0">
+              <a:rPr lang="en-US" sz="1200" b="0" strike="noStrike" spc="-1" baseline="-25000" dirty="0">
                 <a:solidFill>
                   <a:srgbClr val="585858"/>
                 </a:solidFill>
@@ -22268,7 +23066,7 @@
               <a:t>y</a:t>
             </a:r>
             <a:r>
-              <a:rPr lang="en-US" sz="1400" b="0" strike="noStrike" spc="-1" baseline="30000" dirty="0">
+              <a:rPr lang="en-US" sz="1200" b="0" strike="noStrike" spc="-1" baseline="30000" dirty="0">
                 <a:solidFill>
                   <a:srgbClr val="585858"/>
                 </a:solidFill>
@@ -22278,7 +23076,7 @@
               <a:t>2</a:t>
             </a:r>
             <a:r>
-              <a:rPr lang="en-US" sz="1400" b="0" strike="noStrike" spc="-1" dirty="0">
+              <a:rPr lang="en-US" sz="1200" b="0" strike="noStrike" spc="-1" dirty="0">
                 <a:solidFill>
                   <a:srgbClr val="585858"/>
                 </a:solidFill>
@@ -22287,7 +23085,7 @@
               </a:rPr>
               <a:t>) for Notre Dame image pair from proj2.ipynb here]</a:t>
             </a:r>
-            <a:endParaRPr lang="en-US" sz="1400" b="0" strike="noStrike" spc="-1" dirty="0">
+            <a:endParaRPr lang="en-US" sz="1200" b="0" strike="noStrike" spc="-1" dirty="0">
               <a:solidFill>
                 <a:srgbClr val="585858"/>
               </a:solidFill>
@@ -22335,18 +23133,124 @@
               </a:tabLst>
             </a:pPr>
             <a:r>
+              <a:rPr lang="en-US" sz="1200" b="0" strike="noStrike" spc="-1" dirty="0">
+                <a:solidFill>
+                  <a:srgbClr val="585858"/>
+                </a:solidFill>
+                <a:latin typeface="Arial"/>
+                <a:ea typeface="Arial"/>
+              </a:rPr>
+              <a:t>[Which areas have highest magnitude? Why?]</a:t>
+            </a:r>
+          </a:p>
+          <a:p>
+            <a:pPr indent="0" defTabSz="914400">
+              <a:lnSpc>
+                <a:spcPct val="115000"/>
+              </a:lnSpc>
+              <a:buNone/>
+              <a:tabLst>
+                <a:tab pos="0" algn="l"/>
+              </a:tabLst>
+            </a:pPr>
+            <a:endParaRPr lang="en-US" sz="1400" spc="-1" dirty="0">
+              <a:solidFill>
+                <a:srgbClr val="585858"/>
+              </a:solidFill>
+              <a:latin typeface="Arial"/>
+            </a:endParaRPr>
+          </a:p>
+          <a:p>
+            <a:pPr>
+              <a:lnSpc>
+                <a:spcPct val="115000"/>
+              </a:lnSpc>
+              <a:tabLst>
+                <a:tab pos="0" algn="l"/>
+              </a:tabLst>
+            </a:pPr>
+            <a:r>
               <a:rPr lang="en-US" sz="1400" b="0" strike="noStrike" spc="-1" dirty="0">
                 <a:solidFill>
-                  <a:srgbClr val="585858"/>
-                </a:solidFill>
-                <a:latin typeface="Arial"/>
-                <a:ea typeface="Arial"/>
-              </a:rPr>
-              <a:t>[Which areas have highest magnitude? Why?]</a:t>
+                  <a:srgbClr val="002060"/>
+                </a:solidFill>
+                <a:latin typeface="Arial"/>
+              </a:rPr>
+              <a:t>Corners have the highest magnitude of the </a:t>
+            </a:r>
+            <a:r>
+              <a:rPr lang="en-US" sz="1400" spc="-1" dirty="0">
+                <a:solidFill>
+                  <a:srgbClr val="002060"/>
+                </a:solidFill>
+                <a:latin typeface="Arial"/>
+                <a:ea typeface="Arial"/>
+              </a:rPr>
+              <a:t>\sqrt(I</a:t>
+            </a:r>
+            <a:r>
+              <a:rPr lang="en-US" sz="1400" spc="-1" baseline="-25000" dirty="0">
+                <a:solidFill>
+                  <a:srgbClr val="002060"/>
+                </a:solidFill>
+                <a:latin typeface="Arial"/>
+                <a:ea typeface="Arial"/>
+              </a:rPr>
+              <a:t>x</a:t>
+            </a:r>
+            <a:r>
+              <a:rPr lang="en-US" sz="1400" spc="-1" baseline="30000" dirty="0">
+                <a:solidFill>
+                  <a:srgbClr val="002060"/>
+                </a:solidFill>
+                <a:latin typeface="Arial"/>
+                <a:ea typeface="Arial"/>
+              </a:rPr>
+              <a:t>2</a:t>
+            </a:r>
+            <a:r>
+              <a:rPr lang="en-US" sz="1400" spc="-1" dirty="0">
+                <a:solidFill>
+                  <a:srgbClr val="002060"/>
+                </a:solidFill>
+                <a:latin typeface="Arial"/>
+                <a:ea typeface="Arial"/>
+              </a:rPr>
+              <a:t> + I</a:t>
+            </a:r>
+            <a:r>
+              <a:rPr lang="en-US" sz="1400" spc="-1" baseline="-25000" dirty="0">
+                <a:solidFill>
+                  <a:srgbClr val="002060"/>
+                </a:solidFill>
+                <a:latin typeface="Arial"/>
+                <a:ea typeface="Arial"/>
+              </a:rPr>
+              <a:t>y</a:t>
+            </a:r>
+            <a:r>
+              <a:rPr lang="en-US" sz="1400" spc="-1" baseline="30000" dirty="0">
+                <a:solidFill>
+                  <a:srgbClr val="002060"/>
+                </a:solidFill>
+                <a:latin typeface="Arial"/>
+                <a:ea typeface="Arial"/>
+              </a:rPr>
+              <a:t>2</a:t>
+            </a:r>
+            <a:r>
+              <a:rPr lang="en-US" sz="1400" spc="-1" dirty="0">
+                <a:solidFill>
+                  <a:srgbClr val="002060"/>
+                </a:solidFill>
+                <a:latin typeface="Arial"/>
+                <a:ea typeface="Arial"/>
+              </a:rPr>
+              <a:t>). This is because corners have gradient changes in all directions, unlike edges, which have a flat gradient in one direction, therefore have the magnitude only in one direction, or a flat region, which has close to 0 gradients. In context of the image, the flat regions that have small magnitudes are regions like the sky etc. which don’t have inherent texture, as we move across pixels in the neighborhood.</a:t>
             </a:r>
             <a:endParaRPr lang="en-US" sz="1400" b="0" strike="noStrike" spc="-1" dirty="0">
               <a:solidFill>
-                <a:schemeClr val="bg2"/>
+                <a:srgbClr val="002060"/>
               </a:solidFill>
               <a:latin typeface="Arial"/>
             </a:endParaRPr>
@@ -22397,8 +23301,27 @@
                 <a:tab pos="0" algn="l"/>
               </a:tabLst>
             </a:pPr>
-            <a:r>
-              <a:rPr lang="en-US" sz="1400" b="0" strike="noStrike" spc="-1" dirty="0">
+            <a:endParaRPr lang="en-US" sz="1400" b="0" strike="noStrike" spc="-1" dirty="0">
+              <a:solidFill>
+                <a:schemeClr val="tx2">
+                  <a:lumMod val="50000"/>
+                </a:schemeClr>
+              </a:solidFill>
+              <a:latin typeface="Arial"/>
+            </a:endParaRPr>
+          </a:p>
+          <a:p>
+            <a:pPr indent="0" defTabSz="914400">
+              <a:lnSpc>
+                <a:spcPct val="115000"/>
+              </a:lnSpc>
+              <a:buNone/>
+              <a:tabLst>
+                <a:tab pos="0" algn="l"/>
+              </a:tabLst>
+            </a:pPr>
+            <a:r>
+              <a:rPr lang="en-US" sz="1200" b="0" strike="noStrike" spc="-1" dirty="0">
                 <a:solidFill>
                   <a:schemeClr val="tx2">
                     <a:lumMod val="50000"/>
@@ -22409,8 +23332,124 @@
               <a:t>[Briefly explain what this value represents and why we need it for the Harris corner detector.]</a:t>
             </a:r>
           </a:p>
+          <a:p>
+            <a:pPr>
+              <a:lnSpc>
+                <a:spcPct val="115000"/>
+              </a:lnSpc>
+              <a:tabLst>
+                <a:tab pos="0" algn="l"/>
+              </a:tabLst>
+            </a:pPr>
+            <a:r>
+              <a:rPr lang="en-US" sz="1400" spc="-1" dirty="0">
+                <a:solidFill>
+                  <a:srgbClr val="002060"/>
+                </a:solidFill>
+                <a:latin typeface="Arial"/>
+                <a:ea typeface="Arial"/>
+              </a:rPr>
+              <a:t>\sqrt(I</a:t>
+            </a:r>
+            <a:r>
+              <a:rPr lang="en-US" sz="1400" spc="-1" baseline="-25000" dirty="0">
+                <a:solidFill>
+                  <a:srgbClr val="002060"/>
+                </a:solidFill>
+                <a:latin typeface="Arial"/>
+                <a:ea typeface="Arial"/>
+              </a:rPr>
+              <a:t>x</a:t>
+            </a:r>
+            <a:r>
+              <a:rPr lang="en-US" sz="1400" spc="-1" baseline="30000" dirty="0">
+                <a:solidFill>
+                  <a:srgbClr val="002060"/>
+                </a:solidFill>
+                <a:latin typeface="Arial"/>
+                <a:ea typeface="Arial"/>
+              </a:rPr>
+              <a:t>2</a:t>
+            </a:r>
+            <a:r>
+              <a:rPr lang="en-US" sz="1400" spc="-1" dirty="0">
+                <a:solidFill>
+                  <a:srgbClr val="002060"/>
+                </a:solidFill>
+                <a:latin typeface="Arial"/>
+                <a:ea typeface="Arial"/>
+              </a:rPr>
+              <a:t> + I</a:t>
+            </a:r>
+            <a:r>
+              <a:rPr lang="en-US" sz="1400" spc="-1" baseline="-25000" dirty="0">
+                <a:solidFill>
+                  <a:srgbClr val="002060"/>
+                </a:solidFill>
+                <a:latin typeface="Arial"/>
+                <a:ea typeface="Arial"/>
+              </a:rPr>
+              <a:t>y</a:t>
+            </a:r>
+            <a:r>
+              <a:rPr lang="en-US" sz="1400" spc="-1" baseline="30000" dirty="0">
+                <a:solidFill>
+                  <a:srgbClr val="002060"/>
+                </a:solidFill>
+                <a:latin typeface="Arial"/>
+                <a:ea typeface="Arial"/>
+              </a:rPr>
+              <a:t>2</a:t>
+            </a:r>
+            <a:r>
+              <a:rPr lang="en-US" sz="1400" spc="-1" dirty="0">
+                <a:solidFill>
+                  <a:srgbClr val="002060"/>
+                </a:solidFill>
+                <a:latin typeface="Arial"/>
+                <a:ea typeface="Arial"/>
+              </a:rPr>
+              <a:t>) shows the magnitude of the gradients at a pixel. It depicts the strength of local intensity change, and the magnitude of the gradient vector. </a:t>
+            </a:r>
+            <a:endParaRPr lang="en-US" sz="1400" b="0" strike="noStrike" spc="-1" dirty="0">
+              <a:solidFill>
+                <a:srgbClr val="002060"/>
+              </a:solidFill>
+              <a:latin typeface="Arial"/>
+            </a:endParaRPr>
+          </a:p>
         </p:txBody>
       </p:sp>
+      <p:pic>
+        <p:nvPicPr>
+          <p:cNvPr id="3" name="Picture 2">
+            <a:extLst>
+              <a:ext uri="{FF2B5EF4-FFF2-40B4-BE49-F238E27FC236}">
+                <a16:creationId xmlns:a16="http://schemas.microsoft.com/office/drawing/2014/main" id="{A68873F0-7C0F-A940-A91C-93ECFF174CDC}"/>
+              </a:ext>
+            </a:extLst>
+          </p:cNvPr>
+          <p:cNvPicPr>
+            <a:picLocks noChangeAspect="1"/>
+          </p:cNvPicPr>
+          <p:nvPr/>
+        </p:nvPicPr>
+        <p:blipFill>
+          <a:blip r:embed="rId2"/>
+          <a:stretch>
+            <a:fillRect/>
+          </a:stretch>
+        </p:blipFill>
+        <p:spPr>
+          <a:xfrm>
+            <a:off x="404377" y="1446340"/>
+            <a:ext cx="3552628" cy="2040123"/>
+          </a:xfrm>
+          <a:prstGeom prst="rect">
+            <a:avLst/>
+          </a:prstGeom>
+        </p:spPr>
+      </p:pic>
     </p:spTree>
   </p:cSld>
   <p:clrMapOvr>
@@ -24773,7 +25812,7 @@
         </p:nvSpPr>
         <p:spPr>
           <a:xfrm>
-            <a:off x="311760" y="444960"/>
+            <a:off x="311759" y="2700"/>
             <a:ext cx="8520120" cy="572400"/>
           </a:xfrm>
           <a:prstGeom prst="rect">
@@ -24830,7 +25869,7 @@
         </p:nvSpPr>
         <p:spPr>
           <a:xfrm>
-            <a:off x="311760" y="1152360"/>
+            <a:off x="311759" y="386005"/>
             <a:ext cx="8520120" cy="3416040"/>
           </a:xfrm>
           <a:prstGeom prst="rect">
@@ -24857,7 +25896,7 @@
               </a:tabLst>
             </a:pPr>
             <a:r>
-              <a:rPr lang="en-US" sz="1800" b="0" strike="noStrike" spc="-1" dirty="0">
+              <a:rPr lang="en-US" sz="1200" b="0" strike="noStrike" spc="-1" dirty="0">
                 <a:solidFill>
                   <a:srgbClr val="585858"/>
                 </a:solidFill>
@@ -24867,7 +25906,7 @@
               <a:t>[insert visualization of I</a:t>
             </a:r>
             <a:r>
-              <a:rPr lang="en-US" sz="1800" b="0" strike="noStrike" spc="-1" baseline="-25000" dirty="0">
+              <a:rPr lang="en-US" sz="1200" b="0" strike="noStrike" spc="-1" baseline="-25000" dirty="0">
                 <a:solidFill>
                   <a:srgbClr val="585858"/>
                 </a:solidFill>
@@ -24877,7 +25916,7 @@
               <a:t>x</a:t>
             </a:r>
             <a:r>
-              <a:rPr lang="en-US" sz="1800" b="0" strike="noStrike" spc="-1" dirty="0">
+              <a:rPr lang="en-US" sz="1200" b="0" strike="noStrike" spc="-1" dirty="0">
                 <a:solidFill>
                   <a:srgbClr val="585858"/>
                 </a:solidFill>
@@ -24887,7 +25926,7 @@
               <a:t>, </a:t>
             </a:r>
             <a:r>
-              <a:rPr lang="en-US" sz="1800" b="0" strike="noStrike" spc="-1" dirty="0" err="1">
+              <a:rPr lang="en-US" sz="1200" b="0" strike="noStrike" spc="-1" dirty="0" err="1">
                 <a:solidFill>
                   <a:srgbClr val="585858"/>
                 </a:solidFill>
@@ -24897,7 +25936,7 @@
               <a:t>I</a:t>
             </a:r>
             <a:r>
-              <a:rPr lang="en-US" sz="1800" b="0" strike="noStrike" spc="-1" baseline="-25000" dirty="0" err="1">
+              <a:rPr lang="en-US" sz="1200" b="0" strike="noStrike" spc="-1" baseline="-25000" dirty="0" err="1">
                 <a:solidFill>
                   <a:srgbClr val="585858"/>
                 </a:solidFill>
@@ -24907,7 +25946,7 @@
               <a:t>y</a:t>
             </a:r>
             <a:r>
-              <a:rPr lang="en-US" sz="1800" b="0" strike="noStrike" spc="-1" dirty="0">
+              <a:rPr lang="en-US" sz="1200" b="0" strike="noStrike" spc="-1" dirty="0">
                 <a:solidFill>
                   <a:srgbClr val="585858"/>
                 </a:solidFill>
@@ -24917,7 +25956,7 @@
               <a:t>, s</a:t>
             </a:r>
             <a:r>
-              <a:rPr lang="en-US" sz="1800" b="0" strike="noStrike" spc="-1" baseline="-25000" dirty="0">
+              <a:rPr lang="en-US" sz="1200" b="0" strike="noStrike" spc="-1" baseline="-25000" dirty="0">
                 <a:solidFill>
                   <a:srgbClr val="585858"/>
                 </a:solidFill>
@@ -24927,7 +25966,7 @@
               <a:t>x</a:t>
             </a:r>
             <a:r>
-              <a:rPr lang="en-US" sz="1800" b="0" strike="noStrike" spc="-1" baseline="30000" dirty="0">
+              <a:rPr lang="en-US" sz="1200" b="0" strike="noStrike" spc="-1" baseline="30000" dirty="0">
                 <a:solidFill>
                   <a:srgbClr val="585858"/>
                 </a:solidFill>
@@ -24937,7 +25976,7 @@
               <a:t>2</a:t>
             </a:r>
             <a:r>
-              <a:rPr lang="en-US" sz="1800" b="0" strike="noStrike" spc="-1" dirty="0">
+              <a:rPr lang="en-US" sz="1200" b="0" strike="noStrike" spc="-1" dirty="0">
                 <a:solidFill>
                   <a:srgbClr val="585858"/>
                 </a:solidFill>
@@ -24947,7 +25986,7 @@
               <a:t>, s</a:t>
             </a:r>
             <a:r>
-              <a:rPr lang="en-US" sz="1800" b="0" strike="noStrike" spc="-1" baseline="-25000" dirty="0">
+              <a:rPr lang="en-US" sz="1200" b="0" strike="noStrike" spc="-1" baseline="-25000" dirty="0">
                 <a:solidFill>
                   <a:srgbClr val="585858"/>
                 </a:solidFill>
@@ -24957,7 +25996,7 @@
               <a:t>y</a:t>
             </a:r>
             <a:r>
-              <a:rPr lang="en-US" sz="1800" b="0" strike="noStrike" spc="-1" baseline="30000" dirty="0">
+              <a:rPr lang="en-US" sz="1200" b="0" strike="noStrike" spc="-1" baseline="30000" dirty="0">
                 <a:solidFill>
                   <a:srgbClr val="585858"/>
                 </a:solidFill>
@@ -24967,7 +26006,7 @@
               <a:t>2</a:t>
             </a:r>
             <a:r>
-              <a:rPr lang="en-US" sz="1800" b="0" strike="noStrike" spc="-1" dirty="0">
+              <a:rPr lang="en-US" sz="1200" b="0" strike="noStrike" spc="-1" dirty="0">
                 <a:solidFill>
                   <a:srgbClr val="585858"/>
                 </a:solidFill>
@@ -24977,7 +26016,7 @@
               <a:t>, </a:t>
             </a:r>
             <a:r>
-              <a:rPr lang="en-US" sz="1800" b="0" strike="noStrike" spc="-1" dirty="0" err="1">
+              <a:rPr lang="en-US" sz="1200" b="0" strike="noStrike" spc="-1" dirty="0" err="1">
                 <a:solidFill>
                   <a:srgbClr val="585858"/>
                 </a:solidFill>
@@ -24987,7 +26026,7 @@
               <a:t>s</a:t>
             </a:r>
             <a:r>
-              <a:rPr lang="en-US" sz="1800" b="0" strike="noStrike" spc="-1" baseline="-25000" dirty="0" err="1">
+              <a:rPr lang="en-US" sz="1200" b="0" strike="noStrike" spc="-1" baseline="-25000" dirty="0" err="1">
                 <a:solidFill>
                   <a:srgbClr val="585858"/>
                 </a:solidFill>
@@ -24997,7 +26036,7 @@
               <a:t>x</a:t>
             </a:r>
             <a:r>
-              <a:rPr lang="en-US" sz="1800" b="0" strike="noStrike" spc="-1" dirty="0" err="1">
+              <a:rPr lang="en-US" sz="1200" b="0" strike="noStrike" spc="-1" dirty="0" err="1">
                 <a:solidFill>
                   <a:srgbClr val="585858"/>
                 </a:solidFill>
@@ -25007,7 +26046,7 @@
               <a:t>s</a:t>
             </a:r>
             <a:r>
-              <a:rPr lang="en-US" sz="1800" b="0" strike="noStrike" spc="-1" baseline="-25000" dirty="0" err="1">
+              <a:rPr lang="en-US" sz="1200" b="0" strike="noStrike" spc="-1" baseline="-25000" dirty="0" err="1">
                 <a:solidFill>
                   <a:srgbClr val="585858"/>
                 </a:solidFill>
@@ -25017,7 +26056,7 @@
               <a:t>y</a:t>
             </a:r>
             <a:r>
-              <a:rPr lang="en-US" sz="1800" b="0" strike="noStrike" spc="-1" dirty="0">
+              <a:rPr lang="en-US" sz="1200" b="0" strike="noStrike" spc="-1" dirty="0">
                 <a:solidFill>
                   <a:srgbClr val="585858"/>
                 </a:solidFill>
@@ -25026,7 +26065,7 @@
               </a:rPr>
               <a:t> for Notre Dame image pair from proj2.ipynb here]</a:t>
             </a:r>
-            <a:endParaRPr lang="en-US" sz="1800" b="0" strike="noStrike" spc="-1" dirty="0">
+            <a:endParaRPr lang="en-US" sz="1200" b="0" strike="noStrike" spc="-1" dirty="0">
               <a:solidFill>
                 <a:srgbClr val="585858"/>
               </a:solidFill>
@@ -25079,8 +26118,46 @@
                 <a:tab pos="0" algn="l"/>
               </a:tabLst>
             </a:pPr>
-            <a:r>
-              <a:rPr lang="en-US" sz="1800" b="0" strike="noStrike" spc="-1" dirty="0">
+            <a:endParaRPr lang="en-US" sz="1800" b="0" strike="noStrike" spc="-1" dirty="0">
+              <a:solidFill>
+                <a:schemeClr val="tx2">
+                  <a:lumMod val="50000"/>
+                </a:schemeClr>
+              </a:solidFill>
+              <a:latin typeface="Arial"/>
+            </a:endParaRPr>
+          </a:p>
+          <a:p>
+            <a:pPr indent="0" defTabSz="914400">
+              <a:lnSpc>
+                <a:spcPct val="115000"/>
+              </a:lnSpc>
+              <a:buNone/>
+              <a:tabLst>
+                <a:tab pos="0" algn="l"/>
+              </a:tabLst>
+            </a:pPr>
+            <a:endParaRPr lang="en-US" sz="1200" spc="-1" dirty="0">
+              <a:solidFill>
+                <a:schemeClr val="tx2">
+                  <a:lumMod val="50000"/>
+                </a:schemeClr>
+              </a:solidFill>
+              <a:latin typeface="Arial"/>
+            </a:endParaRPr>
+          </a:p>
+          <a:p>
+            <a:pPr indent="0" defTabSz="914400">
+              <a:lnSpc>
+                <a:spcPct val="115000"/>
+              </a:lnSpc>
+              <a:buNone/>
+              <a:tabLst>
+                <a:tab pos="0" algn="l"/>
+              </a:tabLst>
+            </a:pPr>
+            <a:r>
+              <a:rPr lang="en-US" sz="1200" b="0" strike="noStrike" spc="-1" dirty="0">
                 <a:solidFill>
                   <a:schemeClr val="tx2">
                     <a:lumMod val="50000"/>
@@ -25091,7 +26168,7 @@
               <a:t>[Briefly explain what these values represent and why we need </a:t>
             </a:r>
             <a:r>
-              <a:rPr lang="en-US" sz="1800" spc="-1" dirty="0">
+              <a:rPr lang="en-US" sz="1200" spc="-1" dirty="0">
                 <a:solidFill>
                   <a:schemeClr val="tx2">
                     <a:lumMod val="50000"/>
@@ -25102,7 +26179,7 @@
               <a:t>them</a:t>
             </a:r>
             <a:r>
-              <a:rPr lang="en-US" sz="1800" b="0" strike="noStrike" spc="-1" dirty="0">
+              <a:rPr lang="en-US" sz="1200" b="0" strike="noStrike" spc="-1" dirty="0">
                 <a:solidFill>
                   <a:schemeClr val="tx2">
                     <a:lumMod val="50000"/>
@@ -25113,8 +26190,117 @@
               <a:t> for the Harris corner detector.]</a:t>
             </a:r>
           </a:p>
+          <a:p>
+            <a:pPr>
+              <a:lnSpc>
+                <a:spcPct val="115000"/>
+              </a:lnSpc>
+              <a:tabLst>
+                <a:tab pos="0" algn="l"/>
+              </a:tabLst>
+            </a:pPr>
+            <a:r>
+              <a:rPr lang="en-US" sz="1200" spc="-1" dirty="0">
+                <a:solidFill>
+                  <a:srgbClr val="002060"/>
+                </a:solidFill>
+                <a:latin typeface="Arial"/>
+              </a:rPr>
+              <a:t>Sx^2, sy^2 and </a:t>
+            </a:r>
+            <a:r>
+              <a:rPr lang="en-US" sz="1200" spc="-1" dirty="0" err="1">
+                <a:solidFill>
+                  <a:srgbClr val="002060"/>
+                </a:solidFill>
+                <a:latin typeface="Arial"/>
+              </a:rPr>
+              <a:t>sxsy</a:t>
+            </a:r>
+            <a:r>
+              <a:rPr lang="en-US" sz="1200" spc="-1" dirty="0">
+                <a:solidFill>
+                  <a:srgbClr val="002060"/>
+                </a:solidFill>
+                <a:latin typeface="Arial"/>
+              </a:rPr>
+              <a:t> are the second moment matrix values. Sx^2 represents the square of the horizontal gradient smoothed by a gaussian filter, sy^2 the square of the vertical gradient(smoothed by gaussian), and </a:t>
+            </a:r>
+            <a:r>
+              <a:rPr lang="en-US" sz="1200" spc="-1" dirty="0" err="1">
+                <a:solidFill>
+                  <a:srgbClr val="002060"/>
+                </a:solidFill>
+                <a:latin typeface="Arial"/>
+              </a:rPr>
+              <a:t>sxsy</a:t>
+            </a:r>
+            <a:r>
+              <a:rPr lang="en-US" sz="1200" spc="-1" dirty="0">
+                <a:solidFill>
+                  <a:srgbClr val="002060"/>
+                </a:solidFill>
+                <a:latin typeface="Arial"/>
+              </a:rPr>
+              <a:t> the product of the 2. They build the Harris matrix, who’s eigen values determine the strength of </a:t>
+            </a:r>
+            <a:r>
+              <a:rPr lang="en-US" sz="1200" spc="-1" dirty="0" err="1">
+                <a:solidFill>
+                  <a:srgbClr val="002060"/>
+                </a:solidFill>
+                <a:latin typeface="Arial"/>
+              </a:rPr>
+              <a:t>cornerness</a:t>
+            </a:r>
+            <a:r>
+              <a:rPr lang="en-US" sz="1200" spc="-1" dirty="0">
+                <a:solidFill>
+                  <a:srgbClr val="002060"/>
+                </a:solidFill>
+                <a:latin typeface="Arial"/>
+              </a:rPr>
+              <a:t> of the pixel(both small – flat region, both large – corner, one small, one large – edge. </a:t>
+            </a:r>
+            <a:endParaRPr lang="en-US" sz="1200" b="0" strike="noStrike" spc="-1" dirty="0">
+              <a:solidFill>
+                <a:srgbClr val="002060"/>
+              </a:solidFill>
+              <a:latin typeface="Arial"/>
+            </a:endParaRPr>
+          </a:p>
         </p:txBody>
       </p:sp>
+      <p:pic>
+        <p:nvPicPr>
+          <p:cNvPr id="3" name="Picture 2">
+            <a:extLst>
+              <a:ext uri="{FF2B5EF4-FFF2-40B4-BE49-F238E27FC236}">
+                <a16:creationId xmlns:a16="http://schemas.microsoft.com/office/drawing/2014/main" id="{45D4EE2F-FFF7-9D47-8689-34DB9FC41C6D}"/>
+              </a:ext>
+            </a:extLst>
+          </p:cNvPr>
+          <p:cNvPicPr>
+            <a:picLocks noChangeAspect="1"/>
+          </p:cNvPicPr>
+          <p:nvPr/>
+        </p:nvPicPr>
+        <p:blipFill>
+          <a:blip r:embed="rId2"/>
+          <a:stretch>
+            <a:fillRect/>
+          </a:stretch>
+        </p:blipFill>
+        <p:spPr>
+          <a:xfrm>
+            <a:off x="2232615" y="777648"/>
+            <a:ext cx="3771675" cy="2990512"/>
+          </a:xfrm>
+          <a:prstGeom prst="rect">
+            <a:avLst/>
+          </a:prstGeom>
+        </p:spPr>
+      </p:pic>
     </p:spTree>
   </p:cSld>
   <p:clrMapOvr>
@@ -25440,7 +26626,7 @@
               </a:tabLst>
             </a:pPr>
             <a:r>
-              <a:rPr lang="en-US" sz="1800" b="0" strike="noStrike" spc="-1" dirty="0">
+              <a:rPr lang="en-US" sz="1600" b="0" strike="noStrike" spc="-1" dirty="0">
                 <a:solidFill>
                   <a:schemeClr val="tx2">
                     <a:lumMod val="50000"/>
@@ -25452,7 +26638,7 @@
               <a:t>[Why </a:t>
             </a:r>
             <a:r>
-              <a:rPr lang="en-US" sz="1800" spc="-1" dirty="0">
+              <a:rPr lang="en-US" sz="1600" spc="-1" dirty="0">
                 <a:solidFill>
                   <a:schemeClr val="tx2">
                     <a:lumMod val="50000"/>
@@ -25464,7 +26650,7 @@
               <a:t>do we convolve the image with a Gaussian filter?</a:t>
             </a:r>
             <a:r>
-              <a:rPr lang="en-US" sz="1800" b="0" strike="noStrike" spc="-1" dirty="0">
+              <a:rPr lang="en-US" sz="1600" b="0" strike="noStrike" spc="-1" dirty="0">
                 <a:solidFill>
                   <a:schemeClr val="tx2">
                     <a:lumMod val="50000"/>
@@ -25475,14 +26661,64 @@
               </a:rPr>
               <a:t>]</a:t>
             </a:r>
-            <a:endParaRPr lang="en-US" sz="1800" b="0" strike="noStrike" spc="-1" dirty="0">
+          </a:p>
+          <a:p>
+            <a:pPr indent="0" defTabSz="914400">
+              <a:lnSpc>
+                <a:spcPct val="115000"/>
+              </a:lnSpc>
+              <a:buNone/>
+              <a:tabLst>
+                <a:tab pos="0" algn="l"/>
+              </a:tabLst>
+            </a:pPr>
+            <a:endParaRPr lang="en-US" sz="1600" b="0" strike="noStrike" spc="-1" dirty="0">
               <a:solidFill>
                 <a:schemeClr val="tx2">
                   <a:lumMod val="50000"/>
                 </a:schemeClr>
               </a:solidFill>
               <a:latin typeface="Arial"/>
-            </a:endParaRPr>
+              <a:ea typeface="Arial"/>
+            </a:endParaRPr>
+          </a:p>
+          <a:p>
+            <a:pPr indent="0" defTabSz="914400">
+              <a:lnSpc>
+                <a:spcPct val="115000"/>
+              </a:lnSpc>
+              <a:buNone/>
+              <a:tabLst>
+                <a:tab pos="0" algn="l"/>
+              </a:tabLst>
+            </a:pPr>
+            <a:r>
+              <a:rPr lang="en-US" sz="1600" spc="-1" dirty="0">
+                <a:solidFill>
+                  <a:srgbClr val="002060"/>
+                </a:solidFill>
+                <a:latin typeface="Arial"/>
+              </a:rPr>
+              <a:t>We convolve the image with a Gaussian Filter because the Harris detector’s goal is to </a:t>
+            </a:r>
+            <a:r>
+              <a:rPr lang="en-US" sz="1600" spc="-1" dirty="0" err="1">
+                <a:solidFill>
+                  <a:srgbClr val="002060"/>
+                </a:solidFill>
+                <a:latin typeface="Arial"/>
+              </a:rPr>
+              <a:t>analyse</a:t>
+            </a:r>
+            <a:r>
+              <a:rPr lang="en-US" sz="1600" spc="-1" dirty="0">
+                <a:solidFill>
+                  <a:srgbClr val="002060"/>
+                </a:solidFill>
+                <a:latin typeface="Arial"/>
+              </a:rPr>
+              <a:t> regions(patches) of the image, not individual pixels. By the convolution, we’re essentially blending information of the neighborhood into the pixel(since it acts like a weighted average). We also want to improve robustness to noise. A single noisy pixel can produce a strong gradient, and smoothening it with a Gaussian ensures that the entries going into the Harris Matrix are stable, and represent the underlying structure of the image, rather than being skewed by random noise of intensities. </a:t>
+            </a:r>
           </a:p>
         </p:txBody>
       </p:sp>
@@ -25669,7 +26905,7 @@
               </a:tabLst>
             </a:pPr>
             <a:r>
-              <a:rPr lang="en-US" sz="1400" b="0" strike="noStrike" spc="-1" dirty="0">
+              <a:rPr lang="en-US" sz="1200" b="0" strike="noStrike" spc="-1" dirty="0">
                 <a:solidFill>
                   <a:srgbClr val="585858"/>
                 </a:solidFill>
@@ -25679,7 +26915,7 @@
               <a:t>[Are gradient features invariant to both additive shifts (brightness) and multiplicative gain (</a:t>
             </a:r>
             <a:r>
-              <a:rPr lang="en-US" sz="1400" b="0" strike="noStrike" spc="-1" dirty="0">
+              <a:rPr lang="en-US" sz="1200" b="0" strike="noStrike" spc="-1" dirty="0">
                 <a:solidFill>
                   <a:schemeClr val="bg2"/>
                 </a:solidFill>
@@ -25689,7 +26925,7 @@
               <a:t>contrast)? Why or why not? See </a:t>
             </a:r>
             <a:r>
-              <a:rPr lang="en-US" sz="1400" b="0" strike="noStrike" spc="-1" dirty="0" err="1">
+              <a:rPr lang="en-US" sz="1200" b="0" strike="noStrike" spc="-1" dirty="0" err="1">
                 <a:solidFill>
                   <a:schemeClr val="bg2"/>
                 </a:solidFill>
@@ -25699,7 +26935,7 @@
               <a:t>Szeliski</a:t>
             </a:r>
             <a:r>
-              <a:rPr lang="en-US" sz="1400" b="0" strike="noStrike" spc="-1" dirty="0">
+              <a:rPr lang="en-US" sz="1200" b="0" strike="noStrike" spc="-1" dirty="0">
                 <a:solidFill>
                   <a:schemeClr val="bg2"/>
                 </a:solidFill>
@@ -25708,15 +26944,256 @@
               </a:rPr>
               <a:t> Figure 3.2]</a:t>
             </a:r>
-            <a:endParaRPr lang="en-US" sz="1400" b="0" strike="noStrike" spc="-1" dirty="0">
+          </a:p>
+          <a:p>
+            <a:pPr indent="0" defTabSz="914400">
+              <a:lnSpc>
+                <a:spcPct val="115000"/>
+              </a:lnSpc>
+              <a:buNone/>
+              <a:tabLst>
+                <a:tab pos="0" algn="l"/>
+              </a:tabLst>
+            </a:pPr>
+            <a:endParaRPr lang="en-US" sz="1200" spc="-1" dirty="0">
               <a:solidFill>
                 <a:schemeClr val="bg2"/>
               </a:solidFill>
               <a:latin typeface="Arial"/>
             </a:endParaRPr>
+          </a:p>
+          <a:p>
+            <a:pPr indent="0" defTabSz="914400">
+              <a:lnSpc>
+                <a:spcPct val="115000"/>
+              </a:lnSpc>
+              <a:buNone/>
+              <a:tabLst>
+                <a:tab pos="0" algn="l"/>
+              </a:tabLst>
+            </a:pPr>
+            <a:r>
+              <a:rPr lang="en-US" sz="1200" spc="-1" dirty="0">
+                <a:solidFill>
+                  <a:srgbClr val="002060"/>
+                </a:solidFill>
+                <a:latin typeface="Arial"/>
+              </a:rPr>
+              <a:t>Gradient Features are invariant to additive shifts, since adding a constant c to I doesn’t change </a:t>
+            </a:r>
+            <a:r>
+              <a:rPr lang="en-US" sz="1200" spc="-1" dirty="0" err="1">
+                <a:solidFill>
+                  <a:srgbClr val="002060"/>
+                </a:solidFill>
+                <a:latin typeface="Arial"/>
+              </a:rPr>
+              <a:t>dI</a:t>
+            </a:r>
+            <a:r>
+              <a:rPr lang="en-US" sz="1200" spc="-1" dirty="0">
+                <a:solidFill>
+                  <a:srgbClr val="002060"/>
+                </a:solidFill>
+                <a:latin typeface="Arial"/>
+              </a:rPr>
+              <a:t>/dx, since d(</a:t>
+            </a:r>
+            <a:r>
+              <a:rPr lang="en-US" sz="1200" spc="-1" dirty="0" err="1">
+                <a:solidFill>
+                  <a:srgbClr val="002060"/>
+                </a:solidFill>
+                <a:latin typeface="Arial"/>
+              </a:rPr>
+              <a:t>I+c</a:t>
+            </a:r>
+            <a:r>
+              <a:rPr lang="en-US" sz="1200" spc="-1" dirty="0">
+                <a:solidFill>
+                  <a:srgbClr val="002060"/>
+                </a:solidFill>
+                <a:latin typeface="Arial"/>
+              </a:rPr>
+              <a:t>)/dx = </a:t>
+            </a:r>
+            <a:r>
+              <a:rPr lang="en-US" sz="1200" spc="-1" dirty="0" err="1">
+                <a:solidFill>
+                  <a:srgbClr val="002060"/>
+                </a:solidFill>
+                <a:latin typeface="Arial"/>
+              </a:rPr>
+              <a:t>dI</a:t>
+            </a:r>
+            <a:r>
+              <a:rPr lang="en-US" sz="1200" spc="-1" dirty="0">
+                <a:solidFill>
+                  <a:srgbClr val="002060"/>
+                </a:solidFill>
+                <a:latin typeface="Arial"/>
+              </a:rPr>
+              <a:t>/dx + dc/dx = </a:t>
+            </a:r>
+            <a:r>
+              <a:rPr lang="en-US" sz="1200" spc="-1" dirty="0" err="1">
+                <a:solidFill>
+                  <a:srgbClr val="002060"/>
+                </a:solidFill>
+                <a:latin typeface="Arial"/>
+              </a:rPr>
+              <a:t>dI</a:t>
+            </a:r>
+            <a:r>
+              <a:rPr lang="en-US" sz="1200" spc="-1" dirty="0">
+                <a:solidFill>
+                  <a:srgbClr val="002060"/>
+                </a:solidFill>
+                <a:latin typeface="Arial"/>
+              </a:rPr>
+              <a:t>/dx + 0. </a:t>
+            </a:r>
+          </a:p>
+          <a:p>
+            <a:pPr indent="0" defTabSz="914400">
+              <a:lnSpc>
+                <a:spcPct val="115000"/>
+              </a:lnSpc>
+              <a:buNone/>
+              <a:tabLst>
+                <a:tab pos="0" algn="l"/>
+              </a:tabLst>
+            </a:pPr>
+            <a:endParaRPr lang="en-US" sz="1200" b="0" strike="noStrike" spc="-1" dirty="0">
+              <a:solidFill>
+                <a:srgbClr val="002060"/>
+              </a:solidFill>
+              <a:latin typeface="Arial"/>
+            </a:endParaRPr>
+          </a:p>
+          <a:p>
+            <a:pPr indent="0" defTabSz="914400">
+              <a:lnSpc>
+                <a:spcPct val="115000"/>
+              </a:lnSpc>
+              <a:buNone/>
+              <a:tabLst>
+                <a:tab pos="0" algn="l"/>
+              </a:tabLst>
+            </a:pPr>
+            <a:r>
+              <a:rPr lang="en-US" sz="1200" spc="-1" dirty="0">
+                <a:solidFill>
+                  <a:srgbClr val="002060"/>
+                </a:solidFill>
+                <a:latin typeface="Arial"/>
+              </a:rPr>
+              <a:t>Multiplicative Gain multiplies each pixel by a constant factor “k”. I =&gt; </a:t>
+            </a:r>
+            <a:r>
+              <a:rPr lang="en-US" sz="1200" spc="-1" dirty="0" err="1">
+                <a:solidFill>
+                  <a:srgbClr val="002060"/>
+                </a:solidFill>
+                <a:latin typeface="Arial"/>
+              </a:rPr>
+              <a:t>kI</a:t>
+            </a:r>
+            <a:endParaRPr lang="en-US" sz="1200" spc="-1" dirty="0">
+              <a:solidFill>
+                <a:srgbClr val="002060"/>
+              </a:solidFill>
+              <a:latin typeface="Arial"/>
+            </a:endParaRPr>
+          </a:p>
+          <a:p>
+            <a:pPr indent="0" defTabSz="914400">
+              <a:lnSpc>
+                <a:spcPct val="115000"/>
+              </a:lnSpc>
+              <a:buNone/>
+              <a:tabLst>
+                <a:tab pos="0" algn="l"/>
+              </a:tabLst>
+            </a:pPr>
+            <a:r>
+              <a:rPr lang="en-US" sz="1200" b="0" strike="noStrike" spc="-1" dirty="0">
+                <a:solidFill>
+                  <a:srgbClr val="002060"/>
+                </a:solidFill>
+                <a:latin typeface="Arial"/>
+              </a:rPr>
+              <a:t>d(</a:t>
+            </a:r>
+            <a:r>
+              <a:rPr lang="en-US" sz="1200" b="0" strike="noStrike" spc="-1" dirty="0" err="1">
+                <a:solidFill>
+                  <a:srgbClr val="002060"/>
+                </a:solidFill>
+                <a:latin typeface="Arial"/>
+              </a:rPr>
+              <a:t>kI</a:t>
+            </a:r>
+            <a:r>
+              <a:rPr lang="en-US" sz="1200" b="0" strike="noStrike" spc="-1" dirty="0">
+                <a:solidFill>
+                  <a:srgbClr val="002060"/>
+                </a:solidFill>
+                <a:latin typeface="Arial"/>
+              </a:rPr>
+              <a:t>)/dx = k * </a:t>
+            </a:r>
+            <a:r>
+              <a:rPr lang="en-US" sz="1200" b="0" strike="noStrike" spc="-1" dirty="0" err="1">
+                <a:solidFill>
+                  <a:srgbClr val="002060"/>
+                </a:solidFill>
+                <a:latin typeface="Arial"/>
+              </a:rPr>
+              <a:t>dI</a:t>
+            </a:r>
+            <a:r>
+              <a:rPr lang="en-US" sz="1200" b="0" strike="noStrike" spc="-1" dirty="0">
+                <a:solidFill>
+                  <a:srgbClr val="002060"/>
+                </a:solidFill>
+                <a:latin typeface="Arial"/>
+              </a:rPr>
+              <a:t>/dx. Here the gradient is also scaled by the multiplicative gain. </a:t>
+            </a:r>
           </a:p>
         </p:txBody>
       </p:sp>
+      <p:pic>
+        <p:nvPicPr>
+          <p:cNvPr id="2" name="Picture 1">
+            <a:extLst>
+              <a:ext uri="{FF2B5EF4-FFF2-40B4-BE49-F238E27FC236}">
+                <a16:creationId xmlns:a16="http://schemas.microsoft.com/office/drawing/2014/main" id="{56A86A48-86E5-FE48-883E-5F23534BC6E9}"/>
+              </a:ext>
+            </a:extLst>
+          </p:cNvPr>
+          <p:cNvPicPr>
+            <a:picLocks noChangeAspect="1"/>
+          </p:cNvPicPr>
+          <p:nvPr/>
+        </p:nvPicPr>
+        <p:blipFill>
+          <a:blip r:embed="rId2"/>
+          <a:stretch>
+            <a:fillRect/>
+          </a:stretch>
+        </p:blipFill>
+        <p:spPr>
+          <a:xfrm>
+            <a:off x="313095" y="2225310"/>
+            <a:ext cx="4040529" cy="2343090"/>
+          </a:xfrm>
+          <a:prstGeom prst="rect">
+            <a:avLst/>
+          </a:prstGeom>
+        </p:spPr>
+      </p:pic>
     </p:spTree>
   </p:cSld>
   <p:clrMapOvr>
@@ -25754,7 +27231,7 @@
         </p:nvSpPr>
         <p:spPr>
           <a:xfrm>
-            <a:off x="311760" y="444960"/>
+            <a:off x="311760" y="125941"/>
             <a:ext cx="8520120" cy="572400"/>
           </a:xfrm>
           <a:prstGeom prst="rect">
@@ -25781,7 +27258,7 @@
               </a:tabLst>
             </a:pPr>
             <a:r>
-              <a:rPr lang="en-US" sz="2300" b="0" strike="noStrike" spc="-1">
+              <a:rPr lang="en-US" sz="2300" b="0" strike="noStrike" spc="-1" dirty="0">
                 <a:solidFill>
                   <a:srgbClr val="000000"/>
                 </a:solidFill>
@@ -25790,7 +27267,7 @@
               </a:rPr>
               <a:t>Part 1: Harris corner detector</a:t>
             </a:r>
-            <a:endParaRPr lang="en-US" sz="2300" b="0" strike="noStrike" spc="-1">
+            <a:endParaRPr lang="en-US" sz="2300" b="0" strike="noStrike" spc="-1" dirty="0">
               <a:solidFill>
                 <a:srgbClr val="000000"/>
               </a:solidFill>
@@ -25811,7 +27288,7 @@
         </p:nvSpPr>
         <p:spPr>
           <a:xfrm>
-            <a:off x="311760" y="1152360"/>
+            <a:off x="311760" y="569733"/>
             <a:ext cx="3999600" cy="3416040"/>
           </a:xfrm>
           <a:prstGeom prst="rect">
@@ -25871,7 +27348,7 @@
         </p:nvSpPr>
         <p:spPr>
           <a:xfrm>
-            <a:off x="4832280" y="1152360"/>
+            <a:off x="4832642" y="2066760"/>
             <a:ext cx="3999600" cy="3416040"/>
           </a:xfrm>
           <a:prstGeom prst="rect">
@@ -25916,6 +27393,66 @@
           </a:p>
         </p:txBody>
       </p:sp>
+      <p:pic>
+        <p:nvPicPr>
+          <p:cNvPr id="2" name="Picture 1">
+            <a:extLst>
+              <a:ext uri="{FF2B5EF4-FFF2-40B4-BE49-F238E27FC236}">
+                <a16:creationId xmlns:a16="http://schemas.microsoft.com/office/drawing/2014/main" id="{E0C2A20C-3150-7B48-9745-6960553DE5A7}"/>
+              </a:ext>
+            </a:extLst>
+          </p:cNvPr>
+          <p:cNvPicPr>
+            <a:picLocks noChangeAspect="1"/>
+          </p:cNvPicPr>
+          <p:nvPr/>
+        </p:nvPicPr>
+        <p:blipFill>
+          <a:blip r:embed="rId2"/>
+          <a:stretch>
+            <a:fillRect/>
+          </a:stretch>
+        </p:blipFill>
+        <p:spPr>
+          <a:xfrm>
+            <a:off x="165097" y="1142133"/>
+            <a:ext cx="4146082" cy="2318814"/>
+          </a:xfrm>
+          <a:prstGeom prst="rect">
+            <a:avLst/>
+          </a:prstGeom>
+        </p:spPr>
+      </p:pic>
+      <p:pic>
+        <p:nvPicPr>
+          <p:cNvPr id="3" name="Picture 2">
+            <a:extLst>
+              <a:ext uri="{FF2B5EF4-FFF2-40B4-BE49-F238E27FC236}">
+                <a16:creationId xmlns:a16="http://schemas.microsoft.com/office/drawing/2014/main" id="{896D5B59-1843-4E4A-BC8F-8DBEB9DE2CE7}"/>
+              </a:ext>
+            </a:extLst>
+          </p:cNvPr>
+          <p:cNvPicPr>
+            <a:picLocks noChangeAspect="1"/>
+          </p:cNvPicPr>
+          <p:nvPr/>
+        </p:nvPicPr>
+        <p:blipFill>
+          <a:blip r:embed="rId3"/>
+          <a:stretch>
+            <a:fillRect/>
+          </a:stretch>
+        </p:blipFill>
+        <p:spPr>
+          <a:xfrm>
+            <a:off x="4311179" y="2663711"/>
+            <a:ext cx="4788181" cy="1765854"/>
+          </a:xfrm>
+          <a:prstGeom prst="rect">
+            <a:avLst/>
+          </a:prstGeom>
+        </p:spPr>
+      </p:pic>
     </p:spTree>
   </p:cSld>
   <p:clrMapOvr>
@@ -26094,7 +27631,7 @@
               </a:tabLst>
             </a:pPr>
             <a:r>
-              <a:rPr lang="en-US" sz="1400" b="0" strike="noStrike" spc="-1" dirty="0">
+              <a:rPr lang="en-US" sz="1200" b="0" strike="noStrike" spc="-1" dirty="0">
                 <a:solidFill>
                   <a:srgbClr val="585858"/>
                 </a:solidFill>
@@ -26104,7 +27641,7 @@
               <a:t>[What are the advantages and disadvantages of using </a:t>
             </a:r>
             <a:r>
-              <a:rPr lang="en-US" sz="1400" b="0" strike="noStrike" spc="-1" dirty="0" err="1">
+              <a:rPr lang="en-US" sz="1200" b="0" strike="noStrike" spc="-1" dirty="0" err="1">
                 <a:solidFill>
                   <a:srgbClr val="585858"/>
                 </a:solidFill>
@@ -26114,7 +27651,7 @@
               <a:t>maxpooling</a:t>
             </a:r>
             <a:r>
-              <a:rPr lang="en-US" sz="1400" b="0" strike="noStrike" spc="-1" dirty="0">
+              <a:rPr lang="en-US" sz="1200" b="0" strike="noStrike" spc="-1" dirty="0">
                 <a:solidFill>
                   <a:srgbClr val="585858"/>
                 </a:solidFill>
@@ -26124,7 +27661,7 @@
               <a:t> for non-maximum suppression (NMS</a:t>
             </a:r>
             <a:r>
-              <a:rPr lang="en-US" sz="1400" b="0" strike="noStrike" spc="-1" dirty="0">
+              <a:rPr lang="en-US" sz="1200" b="0" strike="noStrike" spc="-1" dirty="0">
                 <a:solidFill>
                   <a:schemeClr val="bg2"/>
                 </a:solidFill>
@@ -26138,10 +27675,100 @@
                 <a:schemeClr val="bg2"/>
               </a:solidFill>
               <a:latin typeface="Arial"/>
-            </a:endParaRPr>
+              <a:ea typeface="Arial"/>
+            </a:endParaRPr>
+          </a:p>
+          <a:p>
+            <a:pPr indent="0" defTabSz="914400">
+              <a:lnSpc>
+                <a:spcPct val="115000"/>
+              </a:lnSpc>
+              <a:buNone/>
+              <a:tabLst>
+                <a:tab pos="0" algn="l"/>
+              </a:tabLst>
+            </a:pPr>
+            <a:endParaRPr lang="en-US" sz="1400" spc="-1" dirty="0">
+              <a:solidFill>
+                <a:schemeClr val="bg2"/>
+              </a:solidFill>
+              <a:latin typeface="Arial"/>
+              <a:ea typeface="Arial"/>
+            </a:endParaRPr>
+          </a:p>
+          <a:p>
+            <a:pPr indent="0" defTabSz="914400">
+              <a:lnSpc>
+                <a:spcPct val="115000"/>
+              </a:lnSpc>
+              <a:buNone/>
+              <a:tabLst>
+                <a:tab pos="0" algn="l"/>
+              </a:tabLst>
+            </a:pPr>
+            <a:r>
+              <a:rPr lang="en-US" sz="1200" b="0" strike="noStrike" spc="-1" dirty="0">
+                <a:solidFill>
+                  <a:srgbClr val="002060"/>
+                </a:solidFill>
+                <a:latin typeface="Arial"/>
+                <a:ea typeface="Arial"/>
+              </a:rPr>
+              <a:t>Using </a:t>
+            </a:r>
+            <a:r>
+              <a:rPr lang="en-US" sz="1200" b="0" strike="noStrike" spc="-1" dirty="0" err="1">
+                <a:solidFill>
+                  <a:srgbClr val="002060"/>
+                </a:solidFill>
+                <a:latin typeface="Arial"/>
+                <a:ea typeface="Arial"/>
+              </a:rPr>
+              <a:t>maxpooling</a:t>
+            </a:r>
+            <a:r>
+              <a:rPr lang="en-US" sz="1200" b="0" strike="noStrike" spc="-1" dirty="0">
+                <a:solidFill>
+                  <a:srgbClr val="002060"/>
+                </a:solidFill>
+                <a:latin typeface="Arial"/>
+                <a:ea typeface="Arial"/>
+              </a:rPr>
+              <a:t> for NMS offers the primary advantage of efficiency, as it is highly optimizable and parallelizable, well suited for GPU operations. Its key disadvantage is imprecision, as it only finds local maxima in the pixel grid, and performance is subjective to kernel size. It also handles plateaus of identical values poorly by keeping all of them. This can lead to multiple detections of a single feature. It trades higher-precision and robustness for significant improvement in speed. </a:t>
+            </a:r>
           </a:p>
         </p:txBody>
       </p:sp>
+      <p:pic>
+        <p:nvPicPr>
+          <p:cNvPr id="2" name="Picture 1">
+            <a:extLst>
+              <a:ext uri="{FF2B5EF4-FFF2-40B4-BE49-F238E27FC236}">
+                <a16:creationId xmlns:a16="http://schemas.microsoft.com/office/drawing/2014/main" id="{DABCB1AD-85E2-8547-B147-E7DF65AEF154}"/>
+              </a:ext>
+            </a:extLst>
+          </p:cNvPr>
+          <p:cNvPicPr>
+            <a:picLocks noChangeAspect="1"/>
+          </p:cNvPicPr>
+          <p:nvPr/>
+        </p:nvPicPr>
+        <p:blipFill>
+          <a:blip r:embed="rId2"/>
+          <a:stretch>
+            <a:fillRect/>
+          </a:stretch>
+        </p:blipFill>
+        <p:spPr>
+          <a:xfrm>
+            <a:off x="148411" y="1729251"/>
+            <a:ext cx="4482527" cy="1684998"/>
+          </a:xfrm>
+          <a:prstGeom prst="rect">
+            <a:avLst/>
+          </a:prstGeom>
+        </p:spPr>
+      </p:pic>
     </p:spTree>
   </p:cSld>
   <p:clrMapOvr>
@@ -26191,7 +27818,7 @@
         </p:nvSpPr>
         <p:spPr>
           <a:xfrm>
-            <a:off x="311760" y="444960"/>
+            <a:off x="311760" y="161739"/>
             <a:ext cx="8520120" cy="572400"/>
           </a:xfrm>
           <a:prstGeom prst="rect">
@@ -26218,7 +27845,7 @@
               </a:tabLst>
             </a:pPr>
             <a:r>
-              <a:rPr lang="en-US" sz="2300" b="0" strike="noStrike" spc="-1">
+              <a:rPr lang="en-US" sz="2300" b="0" strike="noStrike" spc="-1" dirty="0">
                 <a:solidFill>
                   <a:srgbClr val="000000"/>
                 </a:solidFill>
@@ -26227,7 +27854,7 @@
               </a:rPr>
               <a:t>Part 1: Harris corner detector</a:t>
             </a:r>
-            <a:endParaRPr lang="en-US" sz="2300" b="0" strike="noStrike" spc="-1">
+            <a:endParaRPr lang="en-US" sz="2300" b="0" strike="noStrike" spc="-1" dirty="0">
               <a:solidFill>
                 <a:srgbClr val="000000"/>
               </a:solidFill>
@@ -26256,7 +27883,7 @@
             </p:nvSpPr>
             <p:spPr>
               <a:xfrm>
-                <a:off x="311760" y="1148862"/>
+                <a:off x="311760" y="334406"/>
                 <a:ext cx="8520120" cy="1946030"/>
               </a:xfrm>
               <a:prstGeom prst="rect">
@@ -26285,8 +27912,31 @@
                     <a:tab pos="0" algn="l"/>
                   </a:tabLst>
                 </a:pPr>
+                <a:endParaRPr lang="en-US" sz="1200" spc="-1" dirty="0">
+                  <a:solidFill>
+                    <a:schemeClr val="tx2">
+                      <a:lumMod val="50000"/>
+                    </a:schemeClr>
+                  </a:solidFill>
+                  <a:latin typeface="Arial"/>
+                  <a:ea typeface="Arial"/>
+                </a:endParaRPr>
+              </a:p>
+              <a:p>
+                <a:pPr indent="0" defTabSz="914400">
+                  <a:lnSpc>
+                    <a:spcPct val="115000"/>
+                  </a:lnSpc>
+                  <a:spcBef>
+                    <a:spcPts val="1599"/>
+                  </a:spcBef>
+                  <a:buNone/>
+                  <a:tabLst>
+                    <a:tab pos="0" algn="l"/>
+                  </a:tabLst>
+                </a:pPr>
                 <a:r>
-                  <a:rPr lang="en-US" sz="1800" spc="-1" dirty="0">
+                  <a:rPr lang="en-US" sz="1200" spc="-1" dirty="0">
                     <a:solidFill>
                       <a:schemeClr val="tx2">
                         <a:lumMod val="50000"/>
@@ -26300,7 +27950,7 @@
                 <a14:m>
                   <m:oMath xmlns:m="http://schemas.openxmlformats.org/officeDocument/2006/math">
                     <m:r>
-                      <a:rPr lang="en-US" sz="1800" b="0" i="1" spc="-1" smtClean="0">
+                      <a:rPr lang="en-US" sz="1200" b="0" i="1" spc="-1" smtClean="0">
                         <a:solidFill>
                           <a:schemeClr val="tx2">
                             <a:lumMod val="50000"/>
@@ -26312,7 +27962,7 @@
                       <m:t>𝑅</m:t>
                     </m:r>
                     <m:r>
-                      <a:rPr lang="en-US" sz="1800" b="0" i="1" spc="-1" smtClean="0">
+                      <a:rPr lang="en-US" sz="1200" b="0" i="1" spc="-1" smtClean="0">
                         <a:solidFill>
                           <a:schemeClr val="tx2">
                             <a:lumMod val="50000"/>
@@ -26326,7 +27976,7 @@
                     <m:func>
                       <m:funcPr>
                         <m:ctrlPr>
-                          <a:rPr lang="en-US" sz="1800" b="0" i="1" spc="-1" smtClean="0">
+                          <a:rPr lang="en-US" sz="1200" b="0" i="1" spc="-1" smtClean="0">
                             <a:solidFill>
                               <a:schemeClr val="tx2">
                                 <a:lumMod val="50000"/>
@@ -26342,7 +27992,7 @@
                           <m:rPr>
                             <m:sty m:val="p"/>
                           </m:rPr>
-                          <a:rPr lang="en-US" sz="1800" b="0" i="0" spc="-1" smtClean="0">
+                          <a:rPr lang="en-US" sz="1200" b="0" i="0" spc="-1" smtClean="0">
                             <a:solidFill>
                               <a:schemeClr val="tx2">
                                 <a:lumMod val="50000"/>
@@ -26358,7 +28008,7 @@
                         <m:d>
                           <m:dPr>
                             <m:ctrlPr>
-                              <a:rPr lang="en-US" sz="1800" b="0" i="1" spc="-1" smtClean="0">
+                              <a:rPr lang="en-US" sz="1200" b="0" i="1" spc="-1" smtClean="0">
                                 <a:solidFill>
                                   <a:schemeClr val="tx2">
                                     <a:lumMod val="50000"/>
@@ -26371,7 +28021,7 @@
                           </m:dPr>
                           <m:e>
                             <m:r>
-                              <a:rPr lang="en-US" sz="1800" b="0" i="1" spc="-1" smtClean="0">
+                              <a:rPr lang="en-US" sz="1200" b="0" i="1" spc="-1" smtClean="0">
                                 <a:solidFill>
                                   <a:schemeClr val="tx2">
                                     <a:lumMod val="50000"/>
@@ -26387,7 +28037,7 @@
                       </m:e>
                     </m:func>
                     <m:r>
-                      <a:rPr lang="en-US" sz="1800" b="0" i="1" spc="-1" smtClean="0">
+                      <a:rPr lang="en-US" sz="1200" b="0" i="1" spc="-1" smtClean="0">
                         <a:solidFill>
                           <a:schemeClr val="tx2">
                             <a:lumMod val="50000"/>
@@ -26399,7 +28049,7 @@
                       <m:t>−</m:t>
                     </m:r>
                     <m:r>
-                      <a:rPr lang="en-US" sz="1800" b="0" i="1" spc="-1" smtClean="0">
+                      <a:rPr lang="en-US" sz="1200" b="0" i="1" spc="-1" smtClean="0">
                         <a:solidFill>
                           <a:schemeClr val="tx2">
                             <a:lumMod val="50000"/>
@@ -26411,7 +28061,7 @@
                       <m:t>𝛼</m:t>
                     </m:r>
                     <m:r>
-                      <a:rPr lang="en-US" sz="1800" b="0" i="1" spc="-1" smtClean="0">
+                      <a:rPr lang="en-US" sz="1200" b="0" i="1" spc="-1" smtClean="0">
                         <a:solidFill>
                           <a:schemeClr val="tx2">
                             <a:lumMod val="50000"/>
@@ -26425,7 +28075,7 @@
                     <m:sSup>
                       <m:sSupPr>
                         <m:ctrlPr>
-                          <a:rPr lang="en-US" sz="1800" b="0" i="1" spc="-1" smtClean="0">
+                          <a:rPr lang="en-US" sz="1200" b="0" i="1" spc="-1" smtClean="0">
                             <a:solidFill>
                               <a:schemeClr val="tx2">
                                 <a:lumMod val="50000"/>
@@ -26441,7 +28091,7 @@
                           <m:rPr>
                             <m:sty m:val="p"/>
                           </m:rPr>
-                          <a:rPr lang="en-US" sz="1800" b="0" i="0" spc="-1" smtClean="0">
+                          <a:rPr lang="en-US" sz="1200" b="0" i="0" spc="-1" smtClean="0">
                             <a:solidFill>
                               <a:schemeClr val="tx2">
                                 <a:lumMod val="50000"/>
@@ -26453,7 +28103,7 @@
                           <m:t>trace</m:t>
                         </m:r>
                         <m:r>
-                          <a:rPr lang="en-US" sz="1800" b="0" i="1" spc="-1" smtClean="0">
+                          <a:rPr lang="en-US" sz="1200" b="0" i="1" spc="-1" smtClean="0">
                             <a:solidFill>
                               <a:schemeClr val="tx2">
                                 <a:lumMod val="50000"/>
@@ -26465,7 +28115,7 @@
                           <m:t>(</m:t>
                         </m:r>
                         <m:r>
-                          <a:rPr lang="en-US" sz="1800" b="0" i="1" spc="-1" smtClean="0">
+                          <a:rPr lang="en-US" sz="1200" b="0" i="1" spc="-1" smtClean="0">
                             <a:solidFill>
                               <a:schemeClr val="tx2">
                                 <a:lumMod val="50000"/>
@@ -26477,7 +28127,7 @@
                           <m:t>𝐴</m:t>
                         </m:r>
                         <m:r>
-                          <a:rPr lang="en-US" sz="1800" b="0" i="1" spc="-1" smtClean="0">
+                          <a:rPr lang="en-US" sz="1200" b="0" i="1" spc="-1" smtClean="0">
                             <a:solidFill>
                               <a:schemeClr val="tx2">
                                 <a:lumMod val="50000"/>
@@ -26491,7 +28141,7 @@
                       </m:e>
                       <m:sup>
                         <m:r>
-                          <a:rPr lang="en-US" sz="1800" b="0" i="1" spc="-1" smtClean="0">
+                          <a:rPr lang="en-US" sz="1200" b="0" i="1" spc="-1" smtClean="0">
                             <a:solidFill>
                               <a:schemeClr val="tx2">
                                 <a:lumMod val="50000"/>
@@ -26507,7 +28157,7 @@
                   </m:oMath>
                 </a14:m>
                 <a:r>
-                  <a:rPr lang="en-US" sz="1800" b="0" strike="noStrike" spc="-1" dirty="0">
+                  <a:rPr lang="en-US" sz="1200" b="0" strike="noStrike" spc="-1" dirty="0">
                     <a:solidFill>
                       <a:schemeClr val="tx2">
                         <a:lumMod val="50000"/>
@@ -26518,11 +28168,77 @@
                   </a:rPr>
                   <a:t>]</a:t>
                 </a:r>
-                <a:endParaRPr lang="en-US" sz="1800" b="0" strike="noStrike" spc="-1" dirty="0">
+              </a:p>
+              <a:p>
+                <a:pPr indent="0" defTabSz="914400">
+                  <a:lnSpc>
+                    <a:spcPct val="115000"/>
+                  </a:lnSpc>
+                  <a:spcBef>
+                    <a:spcPts val="1599"/>
+                  </a:spcBef>
+                  <a:buNone/>
+                  <a:tabLst>
+                    <a:tab pos="0" algn="l"/>
+                  </a:tabLst>
+                </a:pPr>
+                <a:r>
+                  <a:rPr lang="en-US" sz="1200" b="0" strike="noStrike" spc="-1" dirty="0">
+                    <a:solidFill>
+                      <a:srgbClr val="002060"/>
+                    </a:solidFill>
+                    <a:latin typeface="Arial"/>
+                  </a:rPr>
+                  <a:t>The determinant of a 2x2 matrix is the product of its eigen values, and the trace is the sum of eigen values. This </a:t>
+                </a:r>
+                <a:r>
+                  <a:rPr lang="en-US" sz="1200" b="0" strike="noStrike" spc="-1" dirty="0" err="1">
+                    <a:solidFill>
+                      <a:srgbClr val="002060"/>
+                    </a:solidFill>
+                    <a:latin typeface="Arial"/>
+                  </a:rPr>
+                  <a:t>Cornerness</a:t>
+                </a:r>
+                <a:r>
+                  <a:rPr lang="en-US" sz="1200" b="0" strike="noStrike" spc="-1" dirty="0">
+                    <a:solidFill>
+                      <a:srgbClr val="002060"/>
+                    </a:solidFill>
+                    <a:latin typeface="Arial"/>
+                  </a:rPr>
+                  <a:t> score allows for calculation of the strength of the corne</a:t>
+                </a:r>
+                <a:r>
+                  <a:rPr lang="en-US" sz="1200" spc="-1" dirty="0">
+                    <a:solidFill>
+                      <a:srgbClr val="002060"/>
+                    </a:solidFill>
+                    <a:latin typeface="Arial"/>
+                  </a:rPr>
+                  <a:t>r by using these aspects of the eigen values. This R value will be large for corners only(where both eigen values are large), small for edges(a single small eigen value reduces the determinant value), and small for flat regions(product of both small eigen values minimizes the det(A) value further, leading to a close-to-zero / negative </a:t>
+                </a:r>
+                <a:r>
+                  <a:rPr lang="en-US" sz="1200" spc="-1" dirty="0" err="1">
+                    <a:solidFill>
+                      <a:srgbClr val="002060"/>
+                    </a:solidFill>
+                    <a:latin typeface="Arial"/>
+                  </a:rPr>
+                  <a:t>cornerness</a:t>
+                </a:r>
+                <a:r>
+                  <a:rPr lang="en-US" sz="1200" spc="-1" dirty="0">
+                    <a:solidFill>
+                      <a:srgbClr val="002060"/>
+                    </a:solidFill>
+                    <a:latin typeface="Arial"/>
+                  </a:rPr>
+                  <a:t> score. </a:t>
+                </a:r>
+                <a:endParaRPr lang="en-US" sz="1200" b="0" strike="noStrike" spc="-1" dirty="0">
                   <a:solidFill>
-                    <a:schemeClr val="tx2">
-                      <a:lumMod val="50000"/>
-                    </a:schemeClr>
+                    <a:srgbClr val="002060"/>
                   </a:solidFill>
                   <a:latin typeface="Arial"/>
                 </a:endParaRPr>
@@ -26549,7 +28265,7 @@
             </p:nvSpPr>
             <p:spPr>
               <a:xfrm>
-                <a:off x="311760" y="1148862"/>
+                <a:off x="311760" y="334406"/>
                 <a:ext cx="8520120" cy="1946030"/>
               </a:xfrm>
               <a:prstGeom prst="rect">
@@ -26558,7 +28274,7 @@
               <a:blipFill>
                 <a:blip r:embed="rId2"/>
                 <a:stretch>
-                  <a:fillRect l="-572"/>
+                  <a:fillRect b="-4516"/>
                 </a:stretch>
               </a:blipFill>
               <a:ln w="12600">
@@ -26592,7 +28308,7 @@
         </p:nvSpPr>
         <p:spPr>
           <a:xfrm>
-            <a:off x="311760" y="3094891"/>
+            <a:off x="311760" y="2453103"/>
             <a:ext cx="8520120" cy="2165169"/>
           </a:xfrm>
           <a:prstGeom prst="rect">
@@ -26622,7 +28338,7 @@
               </a:tabLst>
             </a:pPr>
             <a:r>
-              <a:rPr lang="en-US" sz="1800" b="0" strike="noStrike" spc="-1" dirty="0">
+              <a:rPr lang="en-US" sz="1200" b="0" strike="noStrike" spc="-1" dirty="0">
                 <a:solidFill>
                   <a:srgbClr val="585858"/>
                 </a:solidFill>
@@ -26632,7 +28348,7 @@
               <a:t>[What is your intuition behind what makes the Harris corner </a:t>
             </a:r>
             <a:r>
-              <a:rPr lang="en-US" sz="1800" b="0" strike="noStrike" spc="-1" dirty="0">
+              <a:rPr lang="en-US" sz="1200" b="0" strike="noStrike" spc="-1" dirty="0">
                 <a:solidFill>
                   <a:schemeClr val="bg2"/>
                 </a:solidFill>
@@ -26641,9 +28357,41 @@
               </a:rPr>
               <a:t>detector effective?]</a:t>
             </a:r>
-            <a:endParaRPr lang="en-US" sz="1800" b="0" strike="noStrike" spc="-1" dirty="0">
-              <a:solidFill>
-                <a:schemeClr val="bg2"/>
+          </a:p>
+          <a:p>
+            <a:pPr indent="0" defTabSz="914400">
+              <a:lnSpc>
+                <a:spcPct val="115000"/>
+              </a:lnSpc>
+              <a:spcBef>
+                <a:spcPts val="1599"/>
+              </a:spcBef>
+              <a:buNone/>
+              <a:tabLst>
+                <a:tab pos="0" algn="l"/>
+              </a:tabLst>
+            </a:pPr>
+            <a:r>
+              <a:rPr lang="en-US" sz="1200" b="0" strike="noStrike" spc="-1" dirty="0">
+                <a:solidFill>
+                  <a:srgbClr val="002060"/>
+                </a:solidFill>
+                <a:latin typeface="Arial"/>
+              </a:rPr>
+              <a:t>The intuition behind the Harris Corner detector is that the corners are information dense, as they have strong 2 dimensional structure. Unlike an edge, which is information-dense only in one direction(perpendicular to the edge) or flat regions(which aren’t informative), a corner possesses strong intensity change in multiple </a:t>
+            </a:r>
+            <a:r>
+              <a:rPr lang="en-US" sz="1200" spc="-1" dirty="0">
+                <a:solidFill>
+                  <a:srgbClr val="002060"/>
+                </a:solidFill>
+                <a:latin typeface="Arial"/>
+              </a:rPr>
+              <a:t>directions, an idea used by the Harris Corner detector for finding features. This allows us to map corners as regions of importance, for tracking, stitching, and recognition.</a:t>
+            </a:r>
+            <a:endParaRPr lang="en-US" sz="1200" b="0" strike="noStrike" spc="-1" dirty="0">
+              <a:solidFill>
+                <a:srgbClr val="002060"/>
               </a:solidFill>
               <a:latin typeface="Arial"/>
             </a:endParaRPr>
@@ -26833,7 +28581,7 @@
               </a:tabLst>
             </a:pPr>
             <a:r>
-              <a:rPr lang="en-US" sz="1400" b="0" strike="noStrike" spc="-1" dirty="0">
+              <a:rPr lang="en-US" sz="1200" b="0" strike="noStrike" spc="-1" dirty="0">
                 <a:solidFill>
                   <a:srgbClr val="585858"/>
                 </a:solidFill>
@@ -26842,15 +28590,91 @@
               </a:rPr>
               <a:t>[Why aren't normalized patches a very good descriptor?]</a:t>
             </a:r>
-            <a:endParaRPr lang="en-US" sz="1400" b="0" strike="noStrike" spc="-1" dirty="0">
+          </a:p>
+          <a:p>
+            <a:pPr indent="0" defTabSz="914400">
+              <a:lnSpc>
+                <a:spcPct val="115000"/>
+              </a:lnSpc>
+              <a:buNone/>
+              <a:tabLst>
+                <a:tab pos="0" algn="l"/>
+              </a:tabLst>
+            </a:pPr>
+            <a:endParaRPr lang="en-US" sz="1200" spc="-1" dirty="0">
               <a:solidFill>
                 <a:srgbClr val="585858"/>
+              </a:solidFill>
+              <a:latin typeface="Arial"/>
+            </a:endParaRPr>
+          </a:p>
+          <a:p>
+            <a:pPr indent="0" defTabSz="914400">
+              <a:lnSpc>
+                <a:spcPct val="115000"/>
+              </a:lnSpc>
+              <a:buNone/>
+              <a:tabLst>
+                <a:tab pos="0" algn="l"/>
+              </a:tabLst>
+            </a:pPr>
+            <a:r>
+              <a:rPr lang="en-US" sz="1200" b="0" strike="noStrike" spc="-1" dirty="0">
+                <a:solidFill>
+                  <a:srgbClr val="002060"/>
+                </a:solidFill>
+                <a:latin typeface="Arial"/>
+              </a:rPr>
+              <a:t>While easy to compute, normalized patch descriptors are sensitive to geometric and illumination changes. Its very fragile to small shifts / rotations. This causes an issue with matching patches which are slightly rotated, as the Euclidean distance between the vector is increased in magnitude almost across all dimensions. Also, normalizing the patch can handle global shifts across the whole image, but fails in cases like occurrence of shadows, highlights in a part of the image. The descriptor also </a:t>
+            </a:r>
+            <a:r>
+              <a:rPr lang="en-US" sz="1200" spc="-1" dirty="0">
+                <a:solidFill>
+                  <a:srgbClr val="002060"/>
+                </a:solidFill>
+                <a:latin typeface="Arial"/>
+              </a:rPr>
+              <a:t>encodes raw pixel intensities, unlike SIFT which captures local gradients, which is much more resilient to exact brightness and color that form the feature (say a shape). </a:t>
+            </a:r>
+            <a:endParaRPr lang="en-US" sz="1200" b="0" strike="noStrike" spc="-1" dirty="0">
+              <a:solidFill>
+                <a:srgbClr val="002060"/>
               </a:solidFill>
               <a:latin typeface="Arial"/>
             </a:endParaRPr>
           </a:p>
         </p:txBody>
       </p:sp>
+      <p:pic>
+        <p:nvPicPr>
+          <p:cNvPr id="2" name="Picture 1">
+            <a:extLst>
+              <a:ext uri="{FF2B5EF4-FFF2-40B4-BE49-F238E27FC236}">
+                <a16:creationId xmlns:a16="http://schemas.microsoft.com/office/drawing/2014/main" id="{7D6A360E-E855-7647-ADC5-860C00E00D0C}"/>
+              </a:ext>
+            </a:extLst>
+          </p:cNvPr>
+          <p:cNvPicPr>
+            <a:picLocks noChangeAspect="1"/>
+          </p:cNvPicPr>
+          <p:nvPr/>
+        </p:nvPicPr>
+        <p:blipFill>
+          <a:blip r:embed="rId2"/>
+          <a:stretch>
+            <a:fillRect/>
+          </a:stretch>
+        </p:blipFill>
+        <p:spPr>
+          <a:xfrm>
+            <a:off x="446185" y="1767267"/>
+            <a:ext cx="2219323" cy="2472960"/>
+          </a:xfrm>
+          <a:prstGeom prst="rect">
+            <a:avLst/>
+          </a:prstGeom>
+        </p:spPr>
+      </p:pic>
     </p:spTree>
   </p:cSld>
   <p:clrMapOvr>

</xml_diff>